<commit_message>
added more detail to the notes section
</commit_message>
<xml_diff>
--- a/Chapter09.pptx
+++ b/Chapter09.pptx
@@ -4,6 +4,9 @@
   <p:sldMasterIdLst>
     <p:sldMasterId id="2147483660" r:id="rId1"/>
   </p:sldMasterIdLst>
+  <p:notesMasterIdLst>
+    <p:notesMasterId r:id="rId15"/>
+  </p:notesMasterIdLst>
   <p:sldIdLst>
     <p:sldId id="256" r:id="rId2"/>
     <p:sldId id="257" r:id="rId3"/>
@@ -122,6 +125,1651 @@
     </p:ext>
   </p:extLst>
 </p:presentation>
+</file>
+
+<file path=ppt/notesMasters/notesMaster1.xml><?xml version="1.0" encoding="utf-8"?>
+<p:notesMaster xmlns:a="http://schemas.openxmlformats.org/drawingml/2006/main" xmlns:r="http://schemas.openxmlformats.org/officeDocument/2006/relationships" xmlns:p="http://schemas.openxmlformats.org/presentationml/2006/main">
+  <p:cSld>
+    <p:bg>
+      <p:bgRef idx="1001">
+        <a:schemeClr val="bg1"/>
+      </p:bgRef>
+    </p:bg>
+    <p:spTree>
+      <p:nvGrpSpPr>
+        <p:cNvPr id="1" name=""/>
+        <p:cNvGrpSpPr/>
+        <p:nvPr/>
+      </p:nvGrpSpPr>
+      <p:grpSpPr>
+        <a:xfrm>
+          <a:off x="0" y="0"/>
+          <a:ext cx="0" cy="0"/>
+          <a:chOff x="0" y="0"/>
+          <a:chExt cx="0" cy="0"/>
+        </a:xfrm>
+      </p:grpSpPr>
+      <p:sp>
+        <p:nvSpPr>
+          <p:cNvPr id="2" name="Header Placeholder 1"/>
+          <p:cNvSpPr>
+            <a:spLocks noGrp="1"/>
+          </p:cNvSpPr>
+          <p:nvPr>
+            <p:ph type="hdr" sz="quarter"/>
+          </p:nvPr>
+        </p:nvSpPr>
+        <p:spPr>
+          <a:xfrm>
+            <a:off x="0" y="0"/>
+            <a:ext cx="2971800" cy="458788"/>
+          </a:xfrm>
+          <a:prstGeom prst="rect">
+            <a:avLst/>
+          </a:prstGeom>
+        </p:spPr>
+        <p:txBody>
+          <a:bodyPr vert="horz" lIns="91440" tIns="45720" rIns="91440" bIns="45720" rtlCol="0"/>
+          <a:lstStyle>
+            <a:lvl1pPr algn="l">
+              <a:defRPr sz="1200"/>
+            </a:lvl1pPr>
+          </a:lstStyle>
+          <a:p>
+            <a:endParaRPr lang="en-US"/>
+          </a:p>
+        </p:txBody>
+      </p:sp>
+      <p:sp>
+        <p:nvSpPr>
+          <p:cNvPr id="3" name="Date Placeholder 2"/>
+          <p:cNvSpPr>
+            <a:spLocks noGrp="1"/>
+          </p:cNvSpPr>
+          <p:nvPr>
+            <p:ph type="dt" idx="1"/>
+          </p:nvPr>
+        </p:nvSpPr>
+        <p:spPr>
+          <a:xfrm>
+            <a:off x="3884613" y="0"/>
+            <a:ext cx="2971800" cy="458788"/>
+          </a:xfrm>
+          <a:prstGeom prst="rect">
+            <a:avLst/>
+          </a:prstGeom>
+        </p:spPr>
+        <p:txBody>
+          <a:bodyPr vert="horz" lIns="91440" tIns="45720" rIns="91440" bIns="45720" rtlCol="0"/>
+          <a:lstStyle>
+            <a:lvl1pPr algn="r">
+              <a:defRPr sz="1200"/>
+            </a:lvl1pPr>
+          </a:lstStyle>
+          <a:p>
+            <a:fld id="{0F9C1CCF-B725-44A7-AA57-5E433BD85C9F}" type="datetimeFigureOut">
+              <a:rPr lang="en-US" smtClean="0"/>
+              <a:t>1/2/22</a:t>
+            </a:fld>
+            <a:endParaRPr lang="en-US"/>
+          </a:p>
+        </p:txBody>
+      </p:sp>
+      <p:sp>
+        <p:nvSpPr>
+          <p:cNvPr id="4" name="Slide Image Placeholder 3"/>
+          <p:cNvSpPr>
+            <a:spLocks noGrp="1" noRot="1" noChangeAspect="1"/>
+          </p:cNvSpPr>
+          <p:nvPr>
+            <p:ph type="sldImg" idx="2"/>
+          </p:nvPr>
+        </p:nvSpPr>
+        <p:spPr>
+          <a:xfrm>
+            <a:off x="685800" y="1143000"/>
+            <a:ext cx="5486400" cy="3086100"/>
+          </a:xfrm>
+          <a:prstGeom prst="rect">
+            <a:avLst/>
+          </a:prstGeom>
+          <a:noFill/>
+          <a:ln w="12700">
+            <a:solidFill>
+              <a:prstClr val="black"/>
+            </a:solidFill>
+          </a:ln>
+        </p:spPr>
+        <p:txBody>
+          <a:bodyPr vert="horz" lIns="91440" tIns="45720" rIns="91440" bIns="45720" rtlCol="0" anchor="ctr"/>
+          <a:lstStyle/>
+          <a:p>
+            <a:endParaRPr lang="en-US"/>
+          </a:p>
+        </p:txBody>
+      </p:sp>
+      <p:sp>
+        <p:nvSpPr>
+          <p:cNvPr id="5" name="Notes Placeholder 4"/>
+          <p:cNvSpPr>
+            <a:spLocks noGrp="1"/>
+          </p:cNvSpPr>
+          <p:nvPr>
+            <p:ph type="body" sz="quarter" idx="3"/>
+          </p:nvPr>
+        </p:nvSpPr>
+        <p:spPr>
+          <a:xfrm>
+            <a:off x="685800" y="4400550"/>
+            <a:ext cx="5486400" cy="3600450"/>
+          </a:xfrm>
+          <a:prstGeom prst="rect">
+            <a:avLst/>
+          </a:prstGeom>
+        </p:spPr>
+        <p:txBody>
+          <a:bodyPr vert="horz" lIns="91440" tIns="45720" rIns="91440" bIns="45720" rtlCol="0"/>
+          <a:lstStyle/>
+          <a:p>
+            <a:pPr lvl="0"/>
+            <a:r>
+              <a:rPr lang="en-US"/>
+              <a:t>Click to edit Master text styles</a:t>
+            </a:r>
+          </a:p>
+          <a:p>
+            <a:pPr lvl="1"/>
+            <a:r>
+              <a:rPr lang="en-US"/>
+              <a:t>Second level</a:t>
+            </a:r>
+          </a:p>
+          <a:p>
+            <a:pPr lvl="2"/>
+            <a:r>
+              <a:rPr lang="en-US"/>
+              <a:t>Third level</a:t>
+            </a:r>
+          </a:p>
+          <a:p>
+            <a:pPr lvl="3"/>
+            <a:r>
+              <a:rPr lang="en-US"/>
+              <a:t>Fourth level</a:t>
+            </a:r>
+          </a:p>
+          <a:p>
+            <a:pPr lvl="4"/>
+            <a:r>
+              <a:rPr lang="en-US"/>
+              <a:t>Fifth level</a:t>
+            </a:r>
+          </a:p>
+        </p:txBody>
+      </p:sp>
+      <p:sp>
+        <p:nvSpPr>
+          <p:cNvPr id="6" name="Footer Placeholder 5"/>
+          <p:cNvSpPr>
+            <a:spLocks noGrp="1"/>
+          </p:cNvSpPr>
+          <p:nvPr>
+            <p:ph type="ftr" sz="quarter" idx="4"/>
+          </p:nvPr>
+        </p:nvSpPr>
+        <p:spPr>
+          <a:xfrm>
+            <a:off x="0" y="8685213"/>
+            <a:ext cx="2971800" cy="458787"/>
+          </a:xfrm>
+          <a:prstGeom prst="rect">
+            <a:avLst/>
+          </a:prstGeom>
+        </p:spPr>
+        <p:txBody>
+          <a:bodyPr vert="horz" lIns="91440" tIns="45720" rIns="91440" bIns="45720" rtlCol="0" anchor="b"/>
+          <a:lstStyle>
+            <a:lvl1pPr algn="l">
+              <a:defRPr sz="1200"/>
+            </a:lvl1pPr>
+          </a:lstStyle>
+          <a:p>
+            <a:endParaRPr lang="en-US"/>
+          </a:p>
+        </p:txBody>
+      </p:sp>
+      <p:sp>
+        <p:nvSpPr>
+          <p:cNvPr id="7" name="Slide Number Placeholder 6"/>
+          <p:cNvSpPr>
+            <a:spLocks noGrp="1"/>
+          </p:cNvSpPr>
+          <p:nvPr>
+            <p:ph type="sldNum" sz="quarter" idx="5"/>
+          </p:nvPr>
+        </p:nvSpPr>
+        <p:spPr>
+          <a:xfrm>
+            <a:off x="3884613" y="8685213"/>
+            <a:ext cx="2971800" cy="458787"/>
+          </a:xfrm>
+          <a:prstGeom prst="rect">
+            <a:avLst/>
+          </a:prstGeom>
+        </p:spPr>
+        <p:txBody>
+          <a:bodyPr vert="horz" lIns="91440" tIns="45720" rIns="91440" bIns="45720" rtlCol="0" anchor="b"/>
+          <a:lstStyle>
+            <a:lvl1pPr algn="r">
+              <a:defRPr sz="1200"/>
+            </a:lvl1pPr>
+          </a:lstStyle>
+          <a:p>
+            <a:fld id="{18BDFEC3-8487-43E8-A154-7C12CBC1FFF2}" type="slidenum">
+              <a:rPr lang="en-US" smtClean="0"/>
+              <a:t>‹#›</a:t>
+            </a:fld>
+            <a:endParaRPr lang="en-US"/>
+          </a:p>
+        </p:txBody>
+      </p:sp>
+    </p:spTree>
+    <p:extLst>
+      <p:ext uri="{BB962C8B-B14F-4D97-AF65-F5344CB8AC3E}">
+        <p14:creationId xmlns:p14="http://schemas.microsoft.com/office/powerpoint/2010/main" val="3782709779"/>
+      </p:ext>
+    </p:extLst>
+  </p:cSld>
+  <p:clrMap bg1="lt1" tx1="dk1" bg2="lt2" tx2="dk2" accent1="accent1" accent2="accent2" accent3="accent3" accent4="accent4" accent5="accent5" accent6="accent6" hlink="hlink" folHlink="folHlink"/>
+  <p:notesStyle>
+    <a:lvl1pPr marL="0" algn="l" defTabSz="914400" rtl="0" eaLnBrk="1" latinLnBrk="0" hangingPunct="1">
+      <a:defRPr sz="1200" kern="1200">
+        <a:solidFill>
+          <a:schemeClr val="tx1"/>
+        </a:solidFill>
+        <a:latin typeface="+mn-lt"/>
+        <a:ea typeface="+mn-ea"/>
+        <a:cs typeface="+mn-cs"/>
+      </a:defRPr>
+    </a:lvl1pPr>
+    <a:lvl2pPr marL="457200" algn="l" defTabSz="914400" rtl="0" eaLnBrk="1" latinLnBrk="0" hangingPunct="1">
+      <a:defRPr sz="1200" kern="1200">
+        <a:solidFill>
+          <a:schemeClr val="tx1"/>
+        </a:solidFill>
+        <a:latin typeface="+mn-lt"/>
+        <a:ea typeface="+mn-ea"/>
+        <a:cs typeface="+mn-cs"/>
+      </a:defRPr>
+    </a:lvl2pPr>
+    <a:lvl3pPr marL="914400" algn="l" defTabSz="914400" rtl="0" eaLnBrk="1" latinLnBrk="0" hangingPunct="1">
+      <a:defRPr sz="1200" kern="1200">
+        <a:solidFill>
+          <a:schemeClr val="tx1"/>
+        </a:solidFill>
+        <a:latin typeface="+mn-lt"/>
+        <a:ea typeface="+mn-ea"/>
+        <a:cs typeface="+mn-cs"/>
+      </a:defRPr>
+    </a:lvl3pPr>
+    <a:lvl4pPr marL="1371600" algn="l" defTabSz="914400" rtl="0" eaLnBrk="1" latinLnBrk="0" hangingPunct="1">
+      <a:defRPr sz="1200" kern="1200">
+        <a:solidFill>
+          <a:schemeClr val="tx1"/>
+        </a:solidFill>
+        <a:latin typeface="+mn-lt"/>
+        <a:ea typeface="+mn-ea"/>
+        <a:cs typeface="+mn-cs"/>
+      </a:defRPr>
+    </a:lvl4pPr>
+    <a:lvl5pPr marL="1828800" algn="l" defTabSz="914400" rtl="0" eaLnBrk="1" latinLnBrk="0" hangingPunct="1">
+      <a:defRPr sz="1200" kern="1200">
+        <a:solidFill>
+          <a:schemeClr val="tx1"/>
+        </a:solidFill>
+        <a:latin typeface="+mn-lt"/>
+        <a:ea typeface="+mn-ea"/>
+        <a:cs typeface="+mn-cs"/>
+      </a:defRPr>
+    </a:lvl5pPr>
+    <a:lvl6pPr marL="2286000" algn="l" defTabSz="914400" rtl="0" eaLnBrk="1" latinLnBrk="0" hangingPunct="1">
+      <a:defRPr sz="1200" kern="1200">
+        <a:solidFill>
+          <a:schemeClr val="tx1"/>
+        </a:solidFill>
+        <a:latin typeface="+mn-lt"/>
+        <a:ea typeface="+mn-ea"/>
+        <a:cs typeface="+mn-cs"/>
+      </a:defRPr>
+    </a:lvl6pPr>
+    <a:lvl7pPr marL="2743200" algn="l" defTabSz="914400" rtl="0" eaLnBrk="1" latinLnBrk="0" hangingPunct="1">
+      <a:defRPr sz="1200" kern="1200">
+        <a:solidFill>
+          <a:schemeClr val="tx1"/>
+        </a:solidFill>
+        <a:latin typeface="+mn-lt"/>
+        <a:ea typeface="+mn-ea"/>
+        <a:cs typeface="+mn-cs"/>
+      </a:defRPr>
+    </a:lvl7pPr>
+    <a:lvl8pPr marL="3200400" algn="l" defTabSz="914400" rtl="0" eaLnBrk="1" latinLnBrk="0" hangingPunct="1">
+      <a:defRPr sz="1200" kern="1200">
+        <a:solidFill>
+          <a:schemeClr val="tx1"/>
+        </a:solidFill>
+        <a:latin typeface="+mn-lt"/>
+        <a:ea typeface="+mn-ea"/>
+        <a:cs typeface="+mn-cs"/>
+      </a:defRPr>
+    </a:lvl8pPr>
+    <a:lvl9pPr marL="3657600" algn="l" defTabSz="914400" rtl="0" eaLnBrk="1" latinLnBrk="0" hangingPunct="1">
+      <a:defRPr sz="1200" kern="1200">
+        <a:solidFill>
+          <a:schemeClr val="tx1"/>
+        </a:solidFill>
+        <a:latin typeface="+mn-lt"/>
+        <a:ea typeface="+mn-ea"/>
+        <a:cs typeface="+mn-cs"/>
+      </a:defRPr>
+    </a:lvl9pPr>
+  </p:notesStyle>
+</p:notesMaster>
+</file>
+
+<file path=ppt/notesSlides/notesSlide1.xml><?xml version="1.0" encoding="utf-8"?>
+<p:notes xmlns:a="http://schemas.openxmlformats.org/drawingml/2006/main" xmlns:r="http://schemas.openxmlformats.org/officeDocument/2006/relationships" xmlns:p="http://schemas.openxmlformats.org/presentationml/2006/main">
+  <p:cSld>
+    <p:spTree>
+      <p:nvGrpSpPr>
+        <p:cNvPr id="1" name=""/>
+        <p:cNvGrpSpPr/>
+        <p:nvPr/>
+      </p:nvGrpSpPr>
+      <p:grpSpPr>
+        <a:xfrm>
+          <a:off x="0" y="0"/>
+          <a:ext cx="0" cy="0"/>
+          <a:chOff x="0" y="0"/>
+          <a:chExt cx="0" cy="0"/>
+        </a:xfrm>
+      </p:grpSpPr>
+      <p:sp>
+        <p:nvSpPr>
+          <p:cNvPr id="2" name="Slide Image Placeholder 1"/>
+          <p:cNvSpPr>
+            <a:spLocks noGrp="1" noRot="1" noChangeAspect="1"/>
+          </p:cNvSpPr>
+          <p:nvPr>
+            <p:ph type="sldImg"/>
+          </p:nvPr>
+        </p:nvSpPr>
+        <p:spPr/>
+      </p:sp>
+      <p:sp>
+        <p:nvSpPr>
+          <p:cNvPr id="3" name="Notes Placeholder 2"/>
+          <p:cNvSpPr>
+            <a:spLocks noGrp="1"/>
+          </p:cNvSpPr>
+          <p:nvPr>
+            <p:ph type="body" idx="1"/>
+          </p:nvPr>
+        </p:nvSpPr>
+        <p:spPr/>
+        <p:txBody>
+          <a:bodyPr/>
+          <a:lstStyle/>
+          <a:p>
+            <a:pPr lvl="0"/>
+            <a:r>
+              <a:rPr/>
+              <a:t>The data informed decision-making framework consists of six steps: ask, acquire, analyze, integrate, decide, and iterate.</a:t>
+            </a:r>
+          </a:p>
+          <a:p>
+            <a:pPr lvl="0" indent="0" marL="0">
+              <a:buNone/>
+            </a:pPr>
+          </a:p>
+          <a:p>
+            <a:pPr lvl="0"/>
+            <a:r>
+              <a:rPr/>
+              <a:t>Different frameworks exist, but these steps are essential for strong decision-making.</a:t>
+            </a:r>
+          </a:p>
+          <a:p>
+            <a:pPr lvl="0" indent="0" marL="0">
+              <a:buNone/>
+            </a:pPr>
+          </a:p>
+          <a:p>
+            <a:pPr lvl="0"/>
+            <a:r>
+              <a:rPr/>
+              <a:t>This framework allows for continuous improvement and learning as decisions are made.</a:t>
+            </a:r>
+          </a:p>
+        </p:txBody>
+      </p:sp>
+      <p:sp>
+        <p:nvSpPr>
+          <p:cNvPr id="4" name="Slide Number Placeholder 3"/>
+          <p:cNvSpPr>
+            <a:spLocks noGrp="1"/>
+          </p:cNvSpPr>
+          <p:nvPr>
+            <p:ph type="sldNum" sz="quarter" idx="10"/>
+          </p:nvPr>
+        </p:nvSpPr>
+        <p:spPr/>
+        <p:txBody>
+          <a:bodyPr/>
+          <a:lstStyle/>
+          <a:p>
+            <a:fld id="{18BDFEC3-8487-43E8-A154-7C12CBC1FFF2}" type="slidenum">
+              <a:rPr lang="en-US"/>
+              <a:t>2</a:t>
+            </a:fld>
+            <a:endParaRPr lang="en-US"/>
+          </a:p>
+        </p:txBody>
+      </p:sp>
+    </p:spTree>
+  </p:cSld>
+</p:notes>
+</file>
+
+<file path=ppt/notesSlides/notesSlide10.xml><?xml version="1.0" encoding="utf-8"?>
+<p:notes xmlns:a="http://schemas.openxmlformats.org/drawingml/2006/main" xmlns:r="http://schemas.openxmlformats.org/officeDocument/2006/relationships" xmlns:p="http://schemas.openxmlformats.org/presentationml/2006/main">
+  <p:cSld>
+    <p:spTree>
+      <p:nvGrpSpPr>
+        <p:cNvPr id="1" name=""/>
+        <p:cNvGrpSpPr/>
+        <p:nvPr/>
+      </p:nvGrpSpPr>
+      <p:grpSpPr>
+        <a:xfrm>
+          <a:off x="0" y="0"/>
+          <a:ext cx="0" cy="0"/>
+          <a:chOff x="0" y="0"/>
+          <a:chExt cx="0" cy="0"/>
+        </a:xfrm>
+      </p:grpSpPr>
+      <p:sp>
+        <p:nvSpPr>
+          <p:cNvPr id="2" name="Slide Image Placeholder 1"/>
+          <p:cNvSpPr>
+            <a:spLocks noGrp="1" noRot="1" noChangeAspect="1"/>
+          </p:cNvSpPr>
+          <p:nvPr>
+            <p:ph type="sldImg"/>
+          </p:nvPr>
+        </p:nvSpPr>
+        <p:spPr/>
+      </p:sp>
+      <p:sp>
+        <p:nvSpPr>
+          <p:cNvPr id="3" name="Notes Placeholder 2"/>
+          <p:cNvSpPr>
+            <a:spLocks noGrp="1"/>
+          </p:cNvSpPr>
+          <p:nvPr>
+            <p:ph type="body" idx="1"/>
+          </p:nvPr>
+        </p:nvSpPr>
+        <p:spPr/>
+        <p:txBody>
+          <a:bodyPr/>
+          <a:lstStyle/>
+          <a:p>
+            <a:pPr lvl="0"/>
+            <a:r>
+              <a:rPr/>
+              <a:t>Iteration is crucial for refining decisions and improving outcomes over time.</a:t>
+            </a:r>
+          </a:p>
+          <a:p>
+            <a:pPr lvl="0" indent="0" marL="0">
+              <a:buNone/>
+            </a:pPr>
+          </a:p>
+          <a:p>
+            <a:pPr lvl="0"/>
+            <a:r>
+              <a:rPr/>
+              <a:t>Learning from past decisions enables continuous improvement and enhances the effectiveness of decision-making.</a:t>
+            </a:r>
+          </a:p>
+          <a:p>
+            <a:pPr lvl="0" indent="0" marL="0">
+              <a:buNone/>
+            </a:pPr>
+          </a:p>
+          <a:p>
+            <a:pPr lvl="0"/>
+            <a:r>
+              <a:rPr/>
+              <a:t>The iterative process ensures that decisions evolve based on feedback and new information.</a:t>
+            </a:r>
+          </a:p>
+        </p:txBody>
+      </p:sp>
+      <p:sp>
+        <p:nvSpPr>
+          <p:cNvPr id="4" name="Slide Number Placeholder 3"/>
+          <p:cNvSpPr>
+            <a:spLocks noGrp="1"/>
+          </p:cNvSpPr>
+          <p:nvPr>
+            <p:ph type="sldNum" sz="quarter" idx="10"/>
+          </p:nvPr>
+        </p:nvSpPr>
+        <p:spPr/>
+        <p:txBody>
+          <a:bodyPr/>
+          <a:lstStyle/>
+          <a:p>
+            <a:fld id="{18BDFEC3-8487-43E8-A154-7C12CBC1FFF2}" type="slidenum">
+              <a:rPr lang="en-US"/>
+              <a:t>11</a:t>
+            </a:fld>
+            <a:endParaRPr lang="en-US"/>
+          </a:p>
+        </p:txBody>
+      </p:sp>
+    </p:spTree>
+  </p:cSld>
+</p:notes>
+</file>
+
+<file path=ppt/notesSlides/notesSlide11.xml><?xml version="1.0" encoding="utf-8"?>
+<p:notes xmlns:a="http://schemas.openxmlformats.org/drawingml/2006/main" xmlns:r="http://schemas.openxmlformats.org/officeDocument/2006/relationships" xmlns:p="http://schemas.openxmlformats.org/presentationml/2006/main">
+  <p:cSld>
+    <p:spTree>
+      <p:nvGrpSpPr>
+        <p:cNvPr id="1" name=""/>
+        <p:cNvGrpSpPr/>
+        <p:nvPr/>
+      </p:nvGrpSpPr>
+      <p:grpSpPr>
+        <a:xfrm>
+          <a:off x="0" y="0"/>
+          <a:ext cx="0" cy="0"/>
+          <a:chOff x="0" y="0"/>
+          <a:chExt cx="0" cy="0"/>
+        </a:xfrm>
+      </p:grpSpPr>
+      <p:sp>
+        <p:nvSpPr>
+          <p:cNvPr id="2" name="Slide Image Placeholder 1"/>
+          <p:cNvSpPr>
+            <a:spLocks noGrp="1" noRot="1" noChangeAspect="1"/>
+          </p:cNvSpPr>
+          <p:nvPr>
+            <p:ph type="sldImg"/>
+          </p:nvPr>
+        </p:nvSpPr>
+        <p:spPr/>
+      </p:sp>
+      <p:sp>
+        <p:nvSpPr>
+          <p:cNvPr id="3" name="Notes Placeholder 2"/>
+          <p:cNvSpPr>
+            <a:spLocks noGrp="1"/>
+          </p:cNvSpPr>
+          <p:nvPr>
+            <p:ph type="body" idx="1"/>
+          </p:nvPr>
+        </p:nvSpPr>
+        <p:spPr/>
+        <p:txBody>
+          <a:bodyPr/>
+          <a:lstStyle/>
+          <a:p>
+            <a:pPr lvl="0"/>
+            <a:r>
+              <a:rPr/>
+              <a:t>The chapter summary highlights key concepts discussed in the chapter, emphasizing the importance of the data informed decision-making framework.</a:t>
+            </a:r>
+          </a:p>
+          <a:p>
+            <a:pPr lvl="0" indent="0" marL="0">
+              <a:buNone/>
+            </a:pPr>
+          </a:p>
+          <a:p>
+            <a:pPr lvl="0"/>
+            <a:r>
+              <a:rPr/>
+              <a:t>An example illustrates how the framework can be applied in a real-world scenario, providing practical insights for implementation.</a:t>
+            </a:r>
+          </a:p>
+          <a:p>
+            <a:pPr lvl="0" indent="0" marL="0">
+              <a:buNone/>
+            </a:pPr>
+          </a:p>
+          <a:p>
+            <a:pPr lvl="0"/>
+            <a:r>
+              <a:rPr/>
+              <a:t>Understanding the framework empowers individuals and organizations to make informed decisions effectively.</a:t>
+            </a:r>
+          </a:p>
+        </p:txBody>
+      </p:sp>
+      <p:sp>
+        <p:nvSpPr>
+          <p:cNvPr id="4" name="Slide Number Placeholder 3"/>
+          <p:cNvSpPr>
+            <a:spLocks noGrp="1"/>
+          </p:cNvSpPr>
+          <p:nvPr>
+            <p:ph type="sldNum" sz="quarter" idx="10"/>
+          </p:nvPr>
+        </p:nvSpPr>
+        <p:spPr/>
+        <p:txBody>
+          <a:bodyPr/>
+          <a:lstStyle/>
+          <a:p>
+            <a:fld id="{18BDFEC3-8487-43E8-A154-7C12CBC1FFF2}" type="slidenum">
+              <a:rPr lang="en-US"/>
+              <a:t>12</a:t>
+            </a:fld>
+            <a:endParaRPr lang="en-US"/>
+          </a:p>
+        </p:txBody>
+      </p:sp>
+    </p:spTree>
+  </p:cSld>
+</p:notes>
+</file>
+
+<file path=ppt/notesSlides/notesSlide12.xml><?xml version="1.0" encoding="utf-8"?>
+<p:notes xmlns:a="http://schemas.openxmlformats.org/drawingml/2006/main" xmlns:r="http://schemas.openxmlformats.org/officeDocument/2006/relationships" xmlns:p="http://schemas.openxmlformats.org/presentationml/2006/main">
+  <p:cSld>
+    <p:spTree>
+      <p:nvGrpSpPr>
+        <p:cNvPr id="1" name=""/>
+        <p:cNvGrpSpPr/>
+        <p:nvPr/>
+      </p:nvGrpSpPr>
+      <p:grpSpPr>
+        <a:xfrm>
+          <a:off x="0" y="0"/>
+          <a:ext cx="0" cy="0"/>
+          <a:chOff x="0" y="0"/>
+          <a:chExt cx="0" cy="0"/>
+        </a:xfrm>
+      </p:grpSpPr>
+      <p:sp>
+        <p:nvSpPr>
+          <p:cNvPr id="2" name="Slide Image Placeholder 1"/>
+          <p:cNvSpPr>
+            <a:spLocks noGrp="1" noRot="1" noChangeAspect="1"/>
+          </p:cNvSpPr>
+          <p:nvPr>
+            <p:ph type="sldImg"/>
+          </p:nvPr>
+        </p:nvSpPr>
+        <p:spPr/>
+      </p:sp>
+      <p:sp>
+        <p:nvSpPr>
+          <p:cNvPr id="3" name="Notes Placeholder 2"/>
+          <p:cNvSpPr>
+            <a:spLocks noGrp="1"/>
+          </p:cNvSpPr>
+          <p:nvPr>
+            <p:ph type="body" idx="1"/>
+          </p:nvPr>
+        </p:nvSpPr>
+        <p:spPr/>
+        <p:txBody>
+          <a:bodyPr/>
+          <a:lstStyle/>
+          <a:p>
+            <a:pPr lvl="0"/>
+            <a:r>
+              <a:rPr/>
+              <a:t>Examples of effective questions for the “Ask” step.</a:t>
+            </a:r>
+          </a:p>
+          <a:p>
+            <a:pPr lvl="0" indent="0" marL="0">
+              <a:buNone/>
+            </a:pPr>
+          </a:p>
+          <a:p>
+            <a:pPr lvl="0"/>
+            <a:r>
+              <a:rPr/>
+              <a:t>Tips for sourcing relevant data in the “Acquire” step.</a:t>
+            </a:r>
+          </a:p>
+          <a:p>
+            <a:pPr lvl="0" indent="0" marL="0">
+              <a:buNone/>
+            </a:pPr>
+          </a:p>
+          <a:p>
+            <a:pPr lvl="0"/>
+            <a:r>
+              <a:rPr/>
+              <a:t>Explanation of common data analysis techniques for the “Analyze” step.</a:t>
+            </a:r>
+          </a:p>
+          <a:p>
+            <a:pPr lvl="0" indent="0" marL="0">
+              <a:buNone/>
+            </a:pPr>
+          </a:p>
+          <a:p>
+            <a:pPr lvl="0"/>
+            <a:r>
+              <a:rPr/>
+              <a:t>Strategies for integrating insights effectively in the “Integrate” step.</a:t>
+            </a:r>
+          </a:p>
+          <a:p>
+            <a:pPr lvl="0" indent="0" marL="0">
+              <a:buNone/>
+            </a:pPr>
+          </a:p>
+          <a:p>
+            <a:pPr lvl="0"/>
+            <a:r>
+              <a:rPr/>
+              <a:t>Guidance on evaluating options in the “Decide” step.</a:t>
+            </a:r>
+          </a:p>
+          <a:p>
+            <a:pPr lvl="0" indent="0" marL="0">
+              <a:buNone/>
+            </a:pPr>
+          </a:p>
+          <a:p>
+            <a:pPr lvl="0"/>
+            <a:r>
+              <a:rPr/>
+              <a:t>Highlight the importance of reflection and learning in the “Iterate” step.</a:t>
+            </a:r>
+          </a:p>
+          <a:p>
+            <a:pPr lvl="0" indent="0" marL="0">
+              <a:buNone/>
+            </a:pPr>
+          </a:p>
+          <a:p>
+            <a:pPr lvl="0"/>
+            <a:r>
+              <a:rPr/>
+              <a:t>Additional notes or references can be added here.</a:t>
+            </a:r>
+          </a:p>
+        </p:txBody>
+      </p:sp>
+      <p:sp>
+        <p:nvSpPr>
+          <p:cNvPr id="4" name="Slide Number Placeholder 3"/>
+          <p:cNvSpPr>
+            <a:spLocks noGrp="1"/>
+          </p:cNvSpPr>
+          <p:nvPr>
+            <p:ph type="sldNum" sz="quarter" idx="10"/>
+          </p:nvPr>
+        </p:nvSpPr>
+        <p:spPr/>
+        <p:txBody>
+          <a:bodyPr/>
+          <a:lstStyle/>
+          <a:p>
+            <a:fld id="{18BDFEC3-8487-43E8-A154-7C12CBC1FFF2}" type="slidenum">
+              <a:rPr lang="en-US"/>
+              <a:t>13</a:t>
+            </a:fld>
+            <a:endParaRPr lang="en-US"/>
+          </a:p>
+        </p:txBody>
+      </p:sp>
+    </p:spTree>
+  </p:cSld>
+</p:notes>
+</file>
+
+<file path=ppt/notesSlides/notesSlide2.xml><?xml version="1.0" encoding="utf-8"?>
+<p:notes xmlns:a="http://schemas.openxmlformats.org/drawingml/2006/main" xmlns:r="http://schemas.openxmlformats.org/officeDocument/2006/relationships" xmlns:p="http://schemas.openxmlformats.org/presentationml/2006/main">
+  <p:cSld>
+    <p:spTree>
+      <p:nvGrpSpPr>
+        <p:cNvPr id="1" name=""/>
+        <p:cNvGrpSpPr/>
+        <p:nvPr/>
+      </p:nvGrpSpPr>
+      <p:grpSpPr>
+        <a:xfrm>
+          <a:off x="0" y="0"/>
+          <a:ext cx="0" cy="0"/>
+          <a:chOff x="0" y="0"/>
+          <a:chExt cx="0" cy="0"/>
+        </a:xfrm>
+      </p:grpSpPr>
+      <p:sp>
+        <p:nvSpPr>
+          <p:cNvPr id="2" name="Slide Image Placeholder 1"/>
+          <p:cNvSpPr>
+            <a:spLocks noGrp="1" noRot="1" noChangeAspect="1"/>
+          </p:cNvSpPr>
+          <p:nvPr>
+            <p:ph type="sldImg"/>
+          </p:nvPr>
+        </p:nvSpPr>
+        <p:spPr/>
+      </p:sp>
+      <p:sp>
+        <p:nvSpPr>
+          <p:cNvPr id="3" name="Notes Placeholder 2"/>
+          <p:cNvSpPr>
+            <a:spLocks noGrp="1"/>
+          </p:cNvSpPr>
+          <p:nvPr>
+            <p:ph type="body" idx="1"/>
+          </p:nvPr>
+        </p:nvSpPr>
+        <p:spPr/>
+        <p:txBody>
+          <a:bodyPr/>
+          <a:lstStyle/>
+          <a:p>
+            <a:pPr lvl="0"/>
+            <a:r>
+              <a:rPr/>
+              <a:t>The modified steps aim to enhance clarity and purpose in each stage of the decision-making process.</a:t>
+            </a:r>
+          </a:p>
+          <a:p>
+            <a:pPr lvl="0" indent="0" marL="0">
+              <a:buNone/>
+            </a:pPr>
+          </a:p>
+          <a:p>
+            <a:pPr lvl="0"/>
+            <a:r>
+              <a:rPr/>
+              <a:t>The framework serves as a guide for effective decision-making, ensuring that data-driven insights are incorporated at every step.</a:t>
+            </a:r>
+          </a:p>
+          <a:p>
+            <a:pPr lvl="0" indent="0" marL="0">
+              <a:buNone/>
+            </a:pPr>
+          </a:p>
+          <a:p>
+            <a:pPr lvl="0"/>
+            <a:r>
+              <a:rPr/>
+              <a:t>Continuous improvement and adaptation are facilitated through the framework’s design.</a:t>
+            </a:r>
+          </a:p>
+        </p:txBody>
+      </p:sp>
+      <p:sp>
+        <p:nvSpPr>
+          <p:cNvPr id="4" name="Slide Number Placeholder 3"/>
+          <p:cNvSpPr>
+            <a:spLocks noGrp="1"/>
+          </p:cNvSpPr>
+          <p:nvPr>
+            <p:ph type="sldNum" sz="quarter" idx="10"/>
+          </p:nvPr>
+        </p:nvSpPr>
+        <p:spPr/>
+        <p:txBody>
+          <a:bodyPr/>
+          <a:lstStyle/>
+          <a:p>
+            <a:fld id="{18BDFEC3-8487-43E8-A154-7C12CBC1FFF2}" type="slidenum">
+              <a:rPr lang="en-US"/>
+              <a:t>3</a:t>
+            </a:fld>
+            <a:endParaRPr lang="en-US"/>
+          </a:p>
+        </p:txBody>
+      </p:sp>
+    </p:spTree>
+  </p:cSld>
+</p:notes>
+</file>
+
+<file path=ppt/notesSlides/notesSlide3.xml><?xml version="1.0" encoding="utf-8"?>
+<p:notes xmlns:a="http://schemas.openxmlformats.org/drawingml/2006/main" xmlns:r="http://schemas.openxmlformats.org/officeDocument/2006/relationships" xmlns:p="http://schemas.openxmlformats.org/presentationml/2006/main">
+  <p:cSld>
+    <p:spTree>
+      <p:nvGrpSpPr>
+        <p:cNvPr id="1" name=""/>
+        <p:cNvGrpSpPr/>
+        <p:nvPr/>
+      </p:nvGrpSpPr>
+      <p:grpSpPr>
+        <a:xfrm>
+          <a:off x="0" y="0"/>
+          <a:ext cx="0" cy="0"/>
+          <a:chOff x="0" y="0"/>
+          <a:chExt cx="0" cy="0"/>
+        </a:xfrm>
+      </p:grpSpPr>
+      <p:sp>
+        <p:nvSpPr>
+          <p:cNvPr id="2" name="Slide Image Placeholder 1"/>
+          <p:cNvSpPr>
+            <a:spLocks noGrp="1" noRot="1" noChangeAspect="1"/>
+          </p:cNvSpPr>
+          <p:nvPr>
+            <p:ph type="sldImg"/>
+          </p:nvPr>
+        </p:nvSpPr>
+        <p:spPr/>
+      </p:sp>
+      <p:sp>
+        <p:nvSpPr>
+          <p:cNvPr id="3" name="Notes Placeholder 2"/>
+          <p:cNvSpPr>
+            <a:spLocks noGrp="1"/>
+          </p:cNvSpPr>
+          <p:nvPr>
+            <p:ph type="body" idx="1"/>
+          </p:nvPr>
+        </p:nvSpPr>
+        <p:spPr/>
+        <p:txBody>
+          <a:bodyPr/>
+          <a:lstStyle/>
+          <a:p>
+            <a:pPr lvl="0"/>
+            <a:r>
+              <a:rPr/>
+              <a:t>The infinite design of the framework facilitates ongoing learning and adaptation as decisions are made.</a:t>
+            </a:r>
+          </a:p>
+          <a:p>
+            <a:pPr lvl="0" indent="0" marL="0">
+              <a:buNone/>
+            </a:pPr>
+          </a:p>
+          <a:p>
+            <a:pPr lvl="0"/>
+            <a:r>
+              <a:rPr/>
+              <a:t>Empowers individuals to iterate and improve based on past experiences and outcomes.</a:t>
+            </a:r>
+          </a:p>
+          <a:p>
+            <a:pPr lvl="0" indent="0" marL="0">
+              <a:buNone/>
+            </a:pPr>
+          </a:p>
+          <a:p>
+            <a:pPr lvl="0"/>
+            <a:r>
+              <a:rPr/>
+              <a:t>Decision-making is not guaranteed, but the framework enables continuous improvement through reflection and learning.</a:t>
+            </a:r>
+          </a:p>
+        </p:txBody>
+      </p:sp>
+      <p:sp>
+        <p:nvSpPr>
+          <p:cNvPr id="4" name="Slide Number Placeholder 3"/>
+          <p:cNvSpPr>
+            <a:spLocks noGrp="1"/>
+          </p:cNvSpPr>
+          <p:nvPr>
+            <p:ph type="sldNum" sz="quarter" idx="10"/>
+          </p:nvPr>
+        </p:nvSpPr>
+        <p:spPr/>
+        <p:txBody>
+          <a:bodyPr/>
+          <a:lstStyle/>
+          <a:p>
+            <a:fld id="{18BDFEC3-8487-43E8-A154-7C12CBC1FFF2}" type="slidenum">
+              <a:rPr lang="en-US"/>
+              <a:t>4</a:t>
+            </a:fld>
+            <a:endParaRPr lang="en-US"/>
+          </a:p>
+        </p:txBody>
+      </p:sp>
+    </p:spTree>
+  </p:cSld>
+</p:notes>
+</file>
+
+<file path=ppt/notesSlides/notesSlide4.xml><?xml version="1.0" encoding="utf-8"?>
+<p:notes xmlns:a="http://schemas.openxmlformats.org/drawingml/2006/main" xmlns:r="http://schemas.openxmlformats.org/officeDocument/2006/relationships" xmlns:p="http://schemas.openxmlformats.org/presentationml/2006/main">
+  <p:cSld>
+    <p:spTree>
+      <p:nvGrpSpPr>
+        <p:cNvPr id="1" name=""/>
+        <p:cNvGrpSpPr/>
+        <p:nvPr/>
+      </p:nvGrpSpPr>
+      <p:grpSpPr>
+        <a:xfrm>
+          <a:off x="0" y="0"/>
+          <a:ext cx="0" cy="0"/>
+          <a:chOff x="0" y="0"/>
+          <a:chExt cx="0" cy="0"/>
+        </a:xfrm>
+      </p:grpSpPr>
+      <p:sp>
+        <p:nvSpPr>
+          <p:cNvPr id="2" name="Slide Image Placeholder 1"/>
+          <p:cNvSpPr>
+            <a:spLocks noGrp="1" noRot="1" noChangeAspect="1"/>
+          </p:cNvSpPr>
+          <p:nvPr>
+            <p:ph type="sldImg"/>
+          </p:nvPr>
+        </p:nvSpPr>
+        <p:spPr/>
+      </p:sp>
+      <p:sp>
+        <p:nvSpPr>
+          <p:cNvPr id="3" name="Notes Placeholder 2"/>
+          <p:cNvSpPr>
+            <a:spLocks noGrp="1"/>
+          </p:cNvSpPr>
+          <p:nvPr>
+            <p:ph type="body" idx="1"/>
+          </p:nvPr>
+        </p:nvSpPr>
+        <p:spPr/>
+        <p:txBody>
+          <a:bodyPr/>
+          <a:lstStyle/>
+          <a:p>
+            <a:pPr lvl="0"/>
+            <a:r>
+              <a:rPr/>
+              <a:t>Each step plays a crucial role in empowering data informed decision-making.</a:t>
+            </a:r>
+          </a:p>
+          <a:p>
+            <a:pPr lvl="0" indent="0" marL="0">
+              <a:buNone/>
+            </a:pPr>
+          </a:p>
+          <a:p>
+            <a:pPr lvl="0"/>
+            <a:r>
+              <a:rPr/>
+              <a:t>Data literacy skills are essential for effectively navigating through the decision-making process.</a:t>
+            </a:r>
+          </a:p>
+          <a:p>
+            <a:pPr lvl="0" indent="0" marL="0">
+              <a:buNone/>
+            </a:pPr>
+          </a:p>
+          <a:p>
+            <a:pPr lvl="0"/>
+            <a:r>
+              <a:rPr/>
+              <a:t>Understanding the framework helps individuals make informed decisions by following a structured approach.</a:t>
+            </a:r>
+          </a:p>
+        </p:txBody>
+      </p:sp>
+      <p:sp>
+        <p:nvSpPr>
+          <p:cNvPr id="4" name="Slide Number Placeholder 3"/>
+          <p:cNvSpPr>
+            <a:spLocks noGrp="1"/>
+          </p:cNvSpPr>
+          <p:nvPr>
+            <p:ph type="sldNum" sz="quarter" idx="10"/>
+          </p:nvPr>
+        </p:nvSpPr>
+        <p:spPr/>
+        <p:txBody>
+          <a:bodyPr/>
+          <a:lstStyle/>
+          <a:p>
+            <a:fld id="{18BDFEC3-8487-43E8-A154-7C12CBC1FFF2}" type="slidenum">
+              <a:rPr lang="en-US"/>
+              <a:t>5</a:t>
+            </a:fld>
+            <a:endParaRPr lang="en-US"/>
+          </a:p>
+        </p:txBody>
+      </p:sp>
+    </p:spTree>
+  </p:cSld>
+</p:notes>
+</file>
+
+<file path=ppt/notesSlides/notesSlide5.xml><?xml version="1.0" encoding="utf-8"?>
+<p:notes xmlns:a="http://schemas.openxmlformats.org/drawingml/2006/main" xmlns:r="http://schemas.openxmlformats.org/officeDocument/2006/relationships" xmlns:p="http://schemas.openxmlformats.org/presentationml/2006/main">
+  <p:cSld>
+    <p:spTree>
+      <p:nvGrpSpPr>
+        <p:cNvPr id="1" name=""/>
+        <p:cNvGrpSpPr/>
+        <p:nvPr/>
+      </p:nvGrpSpPr>
+      <p:grpSpPr>
+        <a:xfrm>
+          <a:off x="0" y="0"/>
+          <a:ext cx="0" cy="0"/>
+          <a:chOff x="0" y="0"/>
+          <a:chExt cx="0" cy="0"/>
+        </a:xfrm>
+      </p:grpSpPr>
+      <p:sp>
+        <p:nvSpPr>
+          <p:cNvPr id="2" name="Slide Image Placeholder 1"/>
+          <p:cNvSpPr>
+            <a:spLocks noGrp="1" noRot="1" noChangeAspect="1"/>
+          </p:cNvSpPr>
+          <p:nvPr>
+            <p:ph type="sldImg"/>
+          </p:nvPr>
+        </p:nvSpPr>
+        <p:spPr/>
+      </p:sp>
+      <p:sp>
+        <p:nvSpPr>
+          <p:cNvPr id="3" name="Notes Placeholder 2"/>
+          <p:cNvSpPr>
+            <a:spLocks noGrp="1"/>
+          </p:cNvSpPr>
+          <p:nvPr>
+            <p:ph type="body" idx="1"/>
+          </p:nvPr>
+        </p:nvSpPr>
+        <p:spPr/>
+        <p:txBody>
+          <a:bodyPr/>
+          <a:lstStyle/>
+          <a:p>
+            <a:pPr lvl="0"/>
+            <a:r>
+              <a:rPr/>
+              <a:t>Asking relevant questions is fundamental to initiating the decision-making journey.</a:t>
+            </a:r>
+          </a:p>
+          <a:p>
+            <a:pPr lvl="0" indent="0" marL="0">
+              <a:buNone/>
+            </a:pPr>
+          </a:p>
+          <a:p>
+            <a:pPr lvl="0"/>
+            <a:r>
+              <a:rPr/>
+              <a:t>Effective questioning ensures clarity and alignment with desired outcomes.</a:t>
+            </a:r>
+          </a:p>
+          <a:p>
+            <a:pPr lvl="0" indent="0" marL="0">
+              <a:buNone/>
+            </a:pPr>
+          </a:p>
+          <a:p>
+            <a:pPr lvl="0"/>
+            <a:r>
+              <a:rPr/>
+              <a:t>The “Ask” step sets the foundation for the entire decision-making process by defining the problem or objective.</a:t>
+            </a:r>
+          </a:p>
+        </p:txBody>
+      </p:sp>
+      <p:sp>
+        <p:nvSpPr>
+          <p:cNvPr id="4" name="Slide Number Placeholder 3"/>
+          <p:cNvSpPr>
+            <a:spLocks noGrp="1"/>
+          </p:cNvSpPr>
+          <p:nvPr>
+            <p:ph type="sldNum" sz="quarter" idx="10"/>
+          </p:nvPr>
+        </p:nvSpPr>
+        <p:spPr/>
+        <p:txBody>
+          <a:bodyPr/>
+          <a:lstStyle/>
+          <a:p>
+            <a:fld id="{18BDFEC3-8487-43E8-A154-7C12CBC1FFF2}" type="slidenum">
+              <a:rPr lang="en-US"/>
+              <a:t>6</a:t>
+            </a:fld>
+            <a:endParaRPr lang="en-US"/>
+          </a:p>
+        </p:txBody>
+      </p:sp>
+    </p:spTree>
+  </p:cSld>
+</p:notes>
+</file>
+
+<file path=ppt/notesSlides/notesSlide6.xml><?xml version="1.0" encoding="utf-8"?>
+<p:notes xmlns:a="http://schemas.openxmlformats.org/drawingml/2006/main" xmlns:r="http://schemas.openxmlformats.org/officeDocument/2006/relationships" xmlns:p="http://schemas.openxmlformats.org/presentationml/2006/main">
+  <p:cSld>
+    <p:spTree>
+      <p:nvGrpSpPr>
+        <p:cNvPr id="1" name=""/>
+        <p:cNvGrpSpPr/>
+        <p:nvPr/>
+      </p:nvGrpSpPr>
+      <p:grpSpPr>
+        <a:xfrm>
+          <a:off x="0" y="0"/>
+          <a:ext cx="0" cy="0"/>
+          <a:chOff x="0" y="0"/>
+          <a:chExt cx="0" cy="0"/>
+        </a:xfrm>
+      </p:grpSpPr>
+      <p:sp>
+        <p:nvSpPr>
+          <p:cNvPr id="2" name="Slide Image Placeholder 1"/>
+          <p:cNvSpPr>
+            <a:spLocks noGrp="1" noRot="1" noChangeAspect="1"/>
+          </p:cNvSpPr>
+          <p:nvPr>
+            <p:ph type="sldImg"/>
+          </p:nvPr>
+        </p:nvSpPr>
+        <p:spPr/>
+      </p:sp>
+      <p:sp>
+        <p:nvSpPr>
+          <p:cNvPr id="3" name="Notes Placeholder 2"/>
+          <p:cNvSpPr>
+            <a:spLocks noGrp="1"/>
+          </p:cNvSpPr>
+          <p:nvPr>
+            <p:ph type="body" idx="1"/>
+          </p:nvPr>
+        </p:nvSpPr>
+        <p:spPr/>
+        <p:txBody>
+          <a:bodyPr/>
+          <a:lstStyle/>
+          <a:p>
+            <a:pPr lvl="0"/>
+            <a:r>
+              <a:rPr/>
+              <a:t>Acquiring relevant data is essential for informed decision-making.</a:t>
+            </a:r>
+          </a:p>
+          <a:p>
+            <a:pPr lvl="0" indent="0" marL="0">
+              <a:buNone/>
+            </a:pPr>
+          </a:p>
+          <a:p>
+            <a:pPr lvl="0"/>
+            <a:r>
+              <a:rPr/>
+              <a:t>This step involves gathering data from diverse sources to inform the analysis process.</a:t>
+            </a:r>
+          </a:p>
+          <a:p>
+            <a:pPr lvl="0" indent="0" marL="0">
+              <a:buNone/>
+            </a:pPr>
+          </a:p>
+          <a:p>
+            <a:pPr lvl="0"/>
+            <a:r>
+              <a:rPr/>
+              <a:t>Data acquisition lays the foundation for subsequent steps in the decision-making framework.</a:t>
+            </a:r>
+          </a:p>
+        </p:txBody>
+      </p:sp>
+      <p:sp>
+        <p:nvSpPr>
+          <p:cNvPr id="4" name="Slide Number Placeholder 3"/>
+          <p:cNvSpPr>
+            <a:spLocks noGrp="1"/>
+          </p:cNvSpPr>
+          <p:nvPr>
+            <p:ph type="sldNum" sz="quarter" idx="10"/>
+          </p:nvPr>
+        </p:nvSpPr>
+        <p:spPr/>
+        <p:txBody>
+          <a:bodyPr/>
+          <a:lstStyle/>
+          <a:p>
+            <a:fld id="{18BDFEC3-8487-43E8-A154-7C12CBC1FFF2}" type="slidenum">
+              <a:rPr lang="en-US"/>
+              <a:t>7</a:t>
+            </a:fld>
+            <a:endParaRPr lang="en-US"/>
+          </a:p>
+        </p:txBody>
+      </p:sp>
+    </p:spTree>
+  </p:cSld>
+</p:notes>
+</file>
+
+<file path=ppt/notesSlides/notesSlide7.xml><?xml version="1.0" encoding="utf-8"?>
+<p:notes xmlns:a="http://schemas.openxmlformats.org/drawingml/2006/main" xmlns:r="http://schemas.openxmlformats.org/officeDocument/2006/relationships" xmlns:p="http://schemas.openxmlformats.org/presentationml/2006/main">
+  <p:cSld>
+    <p:spTree>
+      <p:nvGrpSpPr>
+        <p:cNvPr id="1" name=""/>
+        <p:cNvGrpSpPr/>
+        <p:nvPr/>
+      </p:nvGrpSpPr>
+      <p:grpSpPr>
+        <a:xfrm>
+          <a:off x="0" y="0"/>
+          <a:ext cx="0" cy="0"/>
+          <a:chOff x="0" y="0"/>
+          <a:chExt cx="0" cy="0"/>
+        </a:xfrm>
+      </p:grpSpPr>
+      <p:sp>
+        <p:nvSpPr>
+          <p:cNvPr id="2" name="Slide Image Placeholder 1"/>
+          <p:cNvSpPr>
+            <a:spLocks noGrp="1" noRot="1" noChangeAspect="1"/>
+          </p:cNvSpPr>
+          <p:nvPr>
+            <p:ph type="sldImg"/>
+          </p:nvPr>
+        </p:nvSpPr>
+        <p:spPr/>
+      </p:sp>
+      <p:sp>
+        <p:nvSpPr>
+          <p:cNvPr id="3" name="Notes Placeholder 2"/>
+          <p:cNvSpPr>
+            <a:spLocks noGrp="1"/>
+          </p:cNvSpPr>
+          <p:nvPr>
+            <p:ph type="body" idx="1"/>
+          </p:nvPr>
+        </p:nvSpPr>
+        <p:spPr/>
+        <p:txBody>
+          <a:bodyPr/>
+          <a:lstStyle/>
+          <a:p>
+            <a:pPr lvl="0"/>
+            <a:r>
+              <a:rPr/>
+              <a:t>Data analysis techniques are crucial for extracting insights from the acquired data.</a:t>
+            </a:r>
+          </a:p>
+          <a:p>
+            <a:pPr lvl="0" indent="0" marL="0">
+              <a:buNone/>
+            </a:pPr>
+          </a:p>
+          <a:p>
+            <a:pPr lvl="0"/>
+            <a:r>
+              <a:rPr/>
+              <a:t>Analytical skills enable individuals to interpret data accurately and derive meaningful conclusions.</a:t>
+            </a:r>
+          </a:p>
+          <a:p>
+            <a:pPr lvl="0" indent="0" marL="0">
+              <a:buNone/>
+            </a:pPr>
+          </a:p>
+          <a:p>
+            <a:pPr lvl="0"/>
+            <a:r>
+              <a:rPr/>
+              <a:t>Analysis helps uncover patterns and trends that inform decision-making.</a:t>
+            </a:r>
+          </a:p>
+        </p:txBody>
+      </p:sp>
+      <p:sp>
+        <p:nvSpPr>
+          <p:cNvPr id="4" name="Slide Number Placeholder 3"/>
+          <p:cNvSpPr>
+            <a:spLocks noGrp="1"/>
+          </p:cNvSpPr>
+          <p:nvPr>
+            <p:ph type="sldNum" sz="quarter" idx="10"/>
+          </p:nvPr>
+        </p:nvSpPr>
+        <p:spPr/>
+        <p:txBody>
+          <a:bodyPr/>
+          <a:lstStyle/>
+          <a:p>
+            <a:fld id="{18BDFEC3-8487-43E8-A154-7C12CBC1FFF2}" type="slidenum">
+              <a:rPr lang="en-US"/>
+              <a:t>8</a:t>
+            </a:fld>
+            <a:endParaRPr lang="en-US"/>
+          </a:p>
+        </p:txBody>
+      </p:sp>
+    </p:spTree>
+  </p:cSld>
+</p:notes>
+</file>
+
+<file path=ppt/notesSlides/notesSlide8.xml><?xml version="1.0" encoding="utf-8"?>
+<p:notes xmlns:a="http://schemas.openxmlformats.org/drawingml/2006/main" xmlns:r="http://schemas.openxmlformats.org/officeDocument/2006/relationships" xmlns:p="http://schemas.openxmlformats.org/presentationml/2006/main">
+  <p:cSld>
+    <p:spTree>
+      <p:nvGrpSpPr>
+        <p:cNvPr id="1" name=""/>
+        <p:cNvGrpSpPr/>
+        <p:nvPr/>
+      </p:nvGrpSpPr>
+      <p:grpSpPr>
+        <a:xfrm>
+          <a:off x="0" y="0"/>
+          <a:ext cx="0" cy="0"/>
+          <a:chOff x="0" y="0"/>
+          <a:chExt cx="0" cy="0"/>
+        </a:xfrm>
+      </p:grpSpPr>
+      <p:sp>
+        <p:nvSpPr>
+          <p:cNvPr id="2" name="Slide Image Placeholder 1"/>
+          <p:cNvSpPr>
+            <a:spLocks noGrp="1" noRot="1" noChangeAspect="1"/>
+          </p:cNvSpPr>
+          <p:nvPr>
+            <p:ph type="sldImg"/>
+          </p:nvPr>
+        </p:nvSpPr>
+        <p:spPr/>
+      </p:sp>
+      <p:sp>
+        <p:nvSpPr>
+          <p:cNvPr id="3" name="Notes Placeholder 2"/>
+          <p:cNvSpPr>
+            <a:spLocks noGrp="1"/>
+          </p:cNvSpPr>
+          <p:nvPr>
+            <p:ph type="body" idx="1"/>
+          </p:nvPr>
+        </p:nvSpPr>
+        <p:spPr/>
+        <p:txBody>
+          <a:bodyPr/>
+          <a:lstStyle/>
+          <a:p>
+            <a:pPr lvl="0"/>
+            <a:r>
+              <a:rPr/>
+              <a:t>Integration involves synthesizing insights from data analysis to form a comprehensive understanding.</a:t>
+            </a:r>
+          </a:p>
+          <a:p>
+            <a:pPr lvl="0" indent="0" marL="0">
+              <a:buNone/>
+            </a:pPr>
+          </a:p>
+          <a:p>
+            <a:pPr lvl="0"/>
+            <a:r>
+              <a:rPr/>
+              <a:t>This step ensures that data-driven insights are effectively incorporated into the decision-making process.</a:t>
+            </a:r>
+          </a:p>
+          <a:p>
+            <a:pPr lvl="0" indent="0" marL="0">
+              <a:buNone/>
+            </a:pPr>
+          </a:p>
+          <a:p>
+            <a:pPr lvl="0"/>
+            <a:r>
+              <a:rPr/>
+              <a:t>Integrating insights from various sources enhances the robustness of decision-making.</a:t>
+            </a:r>
+          </a:p>
+        </p:txBody>
+      </p:sp>
+      <p:sp>
+        <p:nvSpPr>
+          <p:cNvPr id="4" name="Slide Number Placeholder 3"/>
+          <p:cNvSpPr>
+            <a:spLocks noGrp="1"/>
+          </p:cNvSpPr>
+          <p:nvPr>
+            <p:ph type="sldNum" sz="quarter" idx="10"/>
+          </p:nvPr>
+        </p:nvSpPr>
+        <p:spPr/>
+        <p:txBody>
+          <a:bodyPr/>
+          <a:lstStyle/>
+          <a:p>
+            <a:fld id="{18BDFEC3-8487-43E8-A154-7C12CBC1FFF2}" type="slidenum">
+              <a:rPr lang="en-US"/>
+              <a:t>9</a:t>
+            </a:fld>
+            <a:endParaRPr lang="en-US"/>
+          </a:p>
+        </p:txBody>
+      </p:sp>
+    </p:spTree>
+  </p:cSld>
+</p:notes>
+</file>
+
+<file path=ppt/notesSlides/notesSlide9.xml><?xml version="1.0" encoding="utf-8"?>
+<p:notes xmlns:a="http://schemas.openxmlformats.org/drawingml/2006/main" xmlns:r="http://schemas.openxmlformats.org/officeDocument/2006/relationships" xmlns:p="http://schemas.openxmlformats.org/presentationml/2006/main">
+  <p:cSld>
+    <p:spTree>
+      <p:nvGrpSpPr>
+        <p:cNvPr id="1" name=""/>
+        <p:cNvGrpSpPr/>
+        <p:nvPr/>
+      </p:nvGrpSpPr>
+      <p:grpSpPr>
+        <a:xfrm>
+          <a:off x="0" y="0"/>
+          <a:ext cx="0" cy="0"/>
+          <a:chOff x="0" y="0"/>
+          <a:chExt cx="0" cy="0"/>
+        </a:xfrm>
+      </p:grpSpPr>
+      <p:sp>
+        <p:nvSpPr>
+          <p:cNvPr id="2" name="Slide Image Placeholder 1"/>
+          <p:cNvSpPr>
+            <a:spLocks noGrp="1" noRot="1" noChangeAspect="1"/>
+          </p:cNvSpPr>
+          <p:nvPr>
+            <p:ph type="sldImg"/>
+          </p:nvPr>
+        </p:nvSpPr>
+        <p:spPr/>
+      </p:sp>
+      <p:sp>
+        <p:nvSpPr>
+          <p:cNvPr id="3" name="Notes Placeholder 2"/>
+          <p:cNvSpPr>
+            <a:spLocks noGrp="1"/>
+          </p:cNvSpPr>
+          <p:nvPr>
+            <p:ph type="body" idx="1"/>
+          </p:nvPr>
+        </p:nvSpPr>
+        <p:spPr/>
+        <p:txBody>
+          <a:bodyPr/>
+          <a:lstStyle/>
+          <a:p>
+            <a:pPr lvl="0"/>
+            <a:r>
+              <a:rPr/>
+              <a:t>Decision-making involves evaluating options based on integrated insights and considering various factors, risks, and benefits.</a:t>
+            </a:r>
+          </a:p>
+          <a:p>
+            <a:pPr lvl="0" indent="0" marL="0">
+              <a:buNone/>
+            </a:pPr>
+          </a:p>
+          <a:p>
+            <a:pPr lvl="0"/>
+            <a:r>
+              <a:rPr/>
+              <a:t>It is essential to weigh these factors to make informed choices that align with organizational objectives.</a:t>
+            </a:r>
+          </a:p>
+          <a:p>
+            <a:pPr lvl="0" indent="0" marL="0">
+              <a:buNone/>
+            </a:pPr>
+          </a:p>
+          <a:p>
+            <a:pPr lvl="0"/>
+            <a:r>
+              <a:rPr/>
+              <a:t>The “Decide” step determines the best course of action based on the analysis and integration of data-driven insights.</a:t>
+            </a:r>
+          </a:p>
+        </p:txBody>
+      </p:sp>
+      <p:sp>
+        <p:nvSpPr>
+          <p:cNvPr id="4" name="Slide Number Placeholder 3"/>
+          <p:cNvSpPr>
+            <a:spLocks noGrp="1"/>
+          </p:cNvSpPr>
+          <p:nvPr>
+            <p:ph type="sldNum" sz="quarter" idx="10"/>
+          </p:nvPr>
+        </p:nvSpPr>
+        <p:spPr/>
+        <p:txBody>
+          <a:bodyPr/>
+          <a:lstStyle/>
+          <a:p>
+            <a:fld id="{18BDFEC3-8487-43E8-A154-7C12CBC1FFF2}" type="slidenum">
+              <a:rPr lang="en-US"/>
+              <a:t>10</a:t>
+            </a:fld>
+            <a:endParaRPr lang="en-US"/>
+          </a:p>
+        </p:txBody>
+      </p:sp>
+    </p:spTree>
+  </p:cSld>
+</p:notes>
 </file>
 
 <file path=ppt/slideLayouts/slideLayout1.xml><?xml version="1.0" encoding="utf-8"?>
@@ -8696,12 +10344,12 @@
       </p:grpSpPr>
       <p:sp>
         <p:nvSpPr>
-          <p:cNvPr id="2" name="Title 1"/>
-          <p:cNvSpPr>
-            <a:spLocks noGrp="1"/>
-          </p:cNvSpPr>
-          <p:nvPr>
-            <p:ph type="title"/>
+          <p:cNvPr id="3" name="Content Placeholder 2"/>
+          <p:cNvSpPr>
+            <a:spLocks noGrp="1"/>
+          </p:cNvSpPr>
+          <p:nvPr>
+            <p:ph idx="1"/>
           </p:nvPr>
         </p:nvSpPr>
         <p:spPr/>
@@ -8710,29 +10358,16 @@
           <a:lstStyle/>
           <a:p>
             <a:pPr lvl="0" indent="0" marL="0">
+              <a:spcBef>
+                <a:spcPts val="3000"/>
+              </a:spcBef>
               <a:buNone/>
             </a:pPr>
             <a:r>
-              <a:rPr/>
+              <a:rPr b="1"/>
               <a:t>09 Data informed decision-making 157</a:t>
             </a:r>
           </a:p>
-        </p:txBody>
-      </p:sp>
-      <p:sp>
-        <p:nvSpPr>
-          <p:cNvPr id="3" name="Content Placeholder 2"/>
-          <p:cNvSpPr>
-            <a:spLocks noGrp="1"/>
-          </p:cNvSpPr>
-          <p:nvPr>
-            <p:ph idx="1"/>
-          </p:nvPr>
-        </p:nvSpPr>
-        <p:spPr/>
-        <p:txBody>
-          <a:bodyPr/>
-          <a:lstStyle/>
           <a:p>
             <a:pPr lvl="0" indent="0" marL="0">
               <a:buNone/>
@@ -8809,21 +10444,7 @@
             <a:pPr lvl="0"/>
             <a:r>
               <a:rPr/>
-              <a:t>Decision-making involves evaluating options based on integrated insights and making informed choices.</a:t>
-            </a:r>
-          </a:p>
-          <a:p>
-            <a:pPr lvl="0"/>
-            <a:r>
-              <a:rPr/>
-              <a:t>Deciding requires weighing factors, risks, and benefits to determine the best course of action.</a:t>
-            </a:r>
-          </a:p>
-          <a:p>
-            <a:pPr lvl="0"/>
-            <a:r>
-              <a:rPr/>
-              <a:t>Effective decision-making is guided by data-informed insights and objectives.</a:t>
+              <a:t>Evaluating options.</a:t>
             </a:r>
           </a:p>
         </p:txBody>
@@ -8893,21 +10514,7 @@
             <a:pPr lvl="0"/>
             <a:r>
               <a:rPr/>
-              <a:t>Iteration is essential for refining decisions and improving outcomes over time.</a:t>
-            </a:r>
-          </a:p>
-          <a:p>
-            <a:pPr lvl="0"/>
-            <a:r>
-              <a:rPr/>
-              <a:t>Learning from past decisions and experiences enables continuous improvement.</a:t>
-            </a:r>
-          </a:p>
-          <a:p>
-            <a:pPr lvl="0"/>
-            <a:r>
-              <a:rPr/>
-              <a:t>Iterative processes enhance the effectiveness of decision-making and drive progress.</a:t>
+              <a:t>Significance of iteration.</a:t>
             </a:r>
           </a:p>
         </p:txBody>
@@ -8977,21 +10584,7 @@
             <a:pPr lvl="0"/>
             <a:r>
               <a:rPr/>
-              <a:t>To conclude the chapter, we’ll summarize the key concepts discussed.</a:t>
-            </a:r>
-          </a:p>
-          <a:p>
-            <a:pPr lvl="0"/>
-            <a:r>
-              <a:rPr/>
-              <a:t>We’ll illustrate the data informed decision-making framework using a real-world example.</a:t>
-            </a:r>
-          </a:p>
-          <a:p>
-            <a:pPr lvl="0"/>
-            <a:r>
-              <a:rPr/>
-              <a:t>Understanding this framework empowers individuals and organizations to make informed decisions effectively.</a:t>
+              <a:t>Summary of key concepts.</a:t>
             </a:r>
           </a:p>
         </p:txBody>
@@ -9061,21 +10654,7 @@
             <a:pPr lvl="0"/>
             <a:r>
               <a:rPr/>
-              <a:t>Additional notes or references can be found here.</a:t>
-            </a:r>
-          </a:p>
-          <a:p>
-            <a:pPr lvl="0"/>
-            <a:r>
-              <a:rPr/>
-              <a:t>Feel free to review these notes for further understanding or clarification.</a:t>
-            </a:r>
-          </a:p>
-          <a:p>
-            <a:pPr lvl="0"/>
-            <a:r>
-              <a:rPr/>
-              <a:t>Let’s leverage this framework to enhance our decision-making capabilities and drive success.</a:t>
+              <a:t>Additional details and references.</a:t>
             </a:r>
           </a:p>
         </p:txBody>
@@ -9145,21 +10724,7 @@
             <a:pPr lvl="0"/>
             <a:r>
               <a:rPr/>
-              <a:t>The data informed decision-making framework consists of six essential steps.</a:t>
-            </a:r>
-          </a:p>
-          <a:p>
-            <a:pPr lvl="0"/>
-            <a:r>
-              <a:rPr/>
-              <a:t>These steps are crucial for making informed and effective decisions.</a:t>
-            </a:r>
-          </a:p>
-          <a:p>
-            <a:pPr lvl="0"/>
-            <a:r>
-              <a:rPr/>
-              <a:t>Let’s explore each step in detail to understand its significance in the decision-making process.</a:t>
+              <a:t>Six essential steps for decision-making.</a:t>
             </a:r>
           </a:p>
         </p:txBody>
@@ -9229,21 +10794,7 @@
             <a:pPr lvl="0"/>
             <a:r>
               <a:rPr/>
-              <a:t>The six steps of the framework are: ask, acquire, analyze, integrate, decide, and iterate.</a:t>
-            </a:r>
-          </a:p>
-          <a:p>
-            <a:pPr lvl="0"/>
-            <a:r>
-              <a:rPr/>
-              <a:t>We’ve modified these steps slightly to enhance clarity and purpose: ask, acquire, analyze, integrate, decide, and iterate.</a:t>
-            </a:r>
-          </a:p>
-          <a:p>
-            <a:pPr lvl="0"/>
-            <a:r>
-              <a:rPr/>
-              <a:t>This framework is designed to provide direction and understanding throughout the decision-making process.</a:t>
+              <a:t>Modified steps for clarity.</a:t>
             </a:r>
           </a:p>
         </p:txBody>
@@ -9313,21 +10864,7 @@
             <a:pPr lvl="0"/>
             <a:r>
               <a:rPr/>
-              <a:t>The framework’s design is infinite, allowing for continuous improvement and learning.</a:t>
-            </a:r>
-          </a:p>
-          <a:p>
-            <a:pPr lvl="0"/>
-            <a:r>
-              <a:rPr/>
-              <a:t>Decision-making is not guaranteed, but the framework enables iteration and learning from past decisions.</a:t>
-            </a:r>
-          </a:p>
-          <a:p>
-            <a:pPr lvl="0"/>
-            <a:r>
-              <a:rPr/>
-              <a:t>Our goal is to constantly improve decisions using our data literacy skills and framework.</a:t>
+              <a:t>Framework’s infinite design.</a:t>
             </a:r>
           </a:p>
         </p:txBody>
@@ -9397,21 +10934,7 @@
             <a:pPr lvl="0"/>
             <a:r>
               <a:rPr/>
-              <a:t>Let’s delve into each step of the framework to gain a deeper understanding.</a:t>
-            </a:r>
-          </a:p>
-          <a:p>
-            <a:pPr lvl="0"/>
-            <a:r>
-              <a:rPr/>
-              <a:t>Each step plays a crucial role in empowering data informed decision-making.</a:t>
-            </a:r>
-          </a:p>
-          <a:p>
-            <a:pPr lvl="0"/>
-            <a:r>
-              <a:rPr/>
-              <a:t>We’ll explore the various facets of data literacy and how they contribute to each step.</a:t>
+              <a:t>Delve into each step.</a:t>
             </a:r>
           </a:p>
         </p:txBody>
@@ -9481,21 +11004,7 @@
             <a:pPr lvl="0"/>
             <a:r>
               <a:rPr/>
-              <a:t>The first step is to ask pertinent questions that guide the decision-making process.</a:t>
-            </a:r>
-          </a:p>
-          <a:p>
-            <a:pPr lvl="0"/>
-            <a:r>
-              <a:rPr/>
-              <a:t>Effective questioning ensures clarity and focus on the desired outcomes.</a:t>
-            </a:r>
-          </a:p>
-          <a:p>
-            <a:pPr lvl="0"/>
-            <a:r>
-              <a:rPr/>
-              <a:t>Asking the right questions is fundamental to initiating the decision-making journey.</a:t>
+              <a:t>Importance of asking questions.</a:t>
             </a:r>
           </a:p>
         </p:txBody>
@@ -9565,21 +11074,7 @@
             <a:pPr lvl="0"/>
             <a:r>
               <a:rPr/>
-              <a:t>Acquiring relevant data is essential for informed decision-making.</a:t>
-            </a:r>
-          </a:p>
-          <a:p>
-            <a:pPr lvl="0"/>
-            <a:r>
-              <a:rPr/>
-              <a:t>This step involves gathering data from various sources to inform the analysis process.</a:t>
-            </a:r>
-          </a:p>
-          <a:p>
-            <a:pPr lvl="0"/>
-            <a:r>
-              <a:rPr/>
-              <a:t>Data acquisition lays the foundation for subsequent steps in the framework.</a:t>
+              <a:t>Significance of acquiring relevant data.</a:t>
             </a:r>
           </a:p>
         </p:txBody>
@@ -9649,21 +11144,7 @@
             <a:pPr lvl="0"/>
             <a:r>
               <a:rPr/>
-              <a:t>Analysis involves examining the acquired data to derive insights and patterns.</a:t>
-            </a:r>
-          </a:p>
-          <a:p>
-            <a:pPr lvl="0"/>
-            <a:r>
-              <a:rPr/>
-              <a:t>Data analysis techniques help uncover meaningful information to support decision-making.</a:t>
-            </a:r>
-          </a:p>
-          <a:p>
-            <a:pPr lvl="0"/>
-            <a:r>
-              <a:rPr/>
-              <a:t>Analytical skills are crucial for interpreting data accurately and effectively.</a:t>
+              <a:t>Importance of data analysis.</a:t>
             </a:r>
           </a:p>
         </p:txBody>
@@ -9733,21 +11214,7 @@
             <a:pPr lvl="0"/>
             <a:r>
               <a:rPr/>
-              <a:t>Integrating insights from data analysis into the decision-making process is imperative.</a:t>
-            </a:r>
-          </a:p>
-          <a:p>
-            <a:pPr lvl="0"/>
-            <a:r>
-              <a:rPr/>
-              <a:t>This step involves synthesizing information to form a comprehensive understanding.</a:t>
-            </a:r>
-          </a:p>
-          <a:p>
-            <a:pPr lvl="0"/>
-            <a:r>
-              <a:rPr/>
-              <a:t>Integration ensures that data-driven insights are incorporated into decision-making effectively.</a:t>
+              <a:t>Role of integration.</a:t>
             </a:r>
           </a:p>
         </p:txBody>

</xml_diff>

<commit_message>
added more detail from the book to notes
</commit_message>
<xml_diff>
--- a/Chapter09.pptx
+++ b/Chapter09.pptx
@@ -520,34 +520,12 @@
           <a:bodyPr/>
           <a:lstStyle/>
           <a:p>
-            <a:pPr lvl="0"/>
+            <a:pPr lvl="0" indent="0" marL="0">
+              <a:buNone/>
+            </a:pPr>
             <a:r>
               <a:rPr/>
-              <a:t>The data informed decision-making framework consists of six steps: ask, acquire, analyze, integrate, decide, and iterate.</a:t>
-            </a:r>
-          </a:p>
-          <a:p>
-            <a:pPr lvl="0" indent="0" marL="0">
-              <a:buNone/>
-            </a:pPr>
-          </a:p>
-          <a:p>
-            <a:pPr lvl="0"/>
-            <a:r>
-              <a:rPr/>
-              <a:t>Different frameworks exist, but these steps are essential for strong decision-making.</a:t>
-            </a:r>
-          </a:p>
-          <a:p>
-            <a:pPr lvl="0" indent="0" marL="0">
-              <a:buNone/>
-            </a:pPr>
-          </a:p>
-          <a:p>
-            <a:pPr lvl="0"/>
-            <a:r>
-              <a:rPr/>
-              <a:t>This framework allows for continuous improvement and learning as decisions are made.</a:t>
+              <a:t>The data informed decision-making framework consists of six steps: ask, acquire, analyze, integrate, decide, and iterate. Different frameworks exist, but these steps are essential for strong decision-making. This framework allows for continuous improvement and learning as decisions are made.</a:t>
             </a:r>
           </a:p>
         </p:txBody>
@@ -624,34 +602,12 @@
           <a:bodyPr/>
           <a:lstStyle/>
           <a:p>
-            <a:pPr lvl="0"/>
+            <a:pPr lvl="0" indent="0" marL="0">
+              <a:buNone/>
+            </a:pPr>
             <a:r>
               <a:rPr/>
-              <a:t>Iteration is crucial for refining decisions and improving outcomes over time.</a:t>
-            </a:r>
-          </a:p>
-          <a:p>
-            <a:pPr lvl="0" indent="0" marL="0">
-              <a:buNone/>
-            </a:pPr>
-          </a:p>
-          <a:p>
-            <a:pPr lvl="0"/>
-            <a:r>
-              <a:rPr/>
-              <a:t>Learning from past decisions enables continuous improvement and enhances the effectiveness of decision-making.</a:t>
-            </a:r>
-          </a:p>
-          <a:p>
-            <a:pPr lvl="0" indent="0" marL="0">
-              <a:buNone/>
-            </a:pPr>
-          </a:p>
-          <a:p>
-            <a:pPr lvl="0"/>
-            <a:r>
-              <a:rPr/>
-              <a:t>The iterative process ensures that decisions evolve based on feedback and new information.</a:t>
+              <a:t>Iteration is crucial for refining decisions and improving outcomes over time. Learning from past decisions enables continuous improvement and enhances the effectiveness of decision-making. The iterative process ensures that decisions evolve based on feedback and new information.</a:t>
             </a:r>
           </a:p>
         </p:txBody>
@@ -728,34 +684,12 @@
           <a:bodyPr/>
           <a:lstStyle/>
           <a:p>
-            <a:pPr lvl="0"/>
+            <a:pPr lvl="0" indent="0" marL="0">
+              <a:buNone/>
+            </a:pPr>
             <a:r>
               <a:rPr/>
-              <a:t>The chapter summary highlights key concepts discussed in the chapter, emphasizing the importance of the data informed decision-making framework.</a:t>
-            </a:r>
-          </a:p>
-          <a:p>
-            <a:pPr lvl="0" indent="0" marL="0">
-              <a:buNone/>
-            </a:pPr>
-          </a:p>
-          <a:p>
-            <a:pPr lvl="0"/>
-            <a:r>
-              <a:rPr/>
-              <a:t>An example illustrates how the framework can be applied in a real-world scenario, providing practical insights for implementation.</a:t>
-            </a:r>
-          </a:p>
-          <a:p>
-            <a:pPr lvl="0" indent="0" marL="0">
-              <a:buNone/>
-            </a:pPr>
-          </a:p>
-          <a:p>
-            <a:pPr lvl="0"/>
-            <a:r>
-              <a:rPr/>
-              <a:t>Understanding the framework empowers individuals and organizations to make informed decisions effectively.</a:t>
+              <a:t>The chapter summary highlights key concepts discussed in the chapter, emphasizing the importance of the data informed decision-making framework. An example illustrates how the framework can be applied in a real-world scenario, providing practical insights for implementation. Understanding the framework empowers individuals and organizations to make informed decisions effectively.</a:t>
             </a:r>
           </a:p>
         </p:txBody>
@@ -832,82 +766,12 @@
           <a:bodyPr/>
           <a:lstStyle/>
           <a:p>
-            <a:pPr lvl="0"/>
+            <a:pPr lvl="0" indent="0" marL="0">
+              <a:buNone/>
+            </a:pPr>
             <a:r>
               <a:rPr/>
-              <a:t>Examples of effective questions for the “Ask” step.</a:t>
-            </a:r>
-          </a:p>
-          <a:p>
-            <a:pPr lvl="0" indent="0" marL="0">
-              <a:buNone/>
-            </a:pPr>
-          </a:p>
-          <a:p>
-            <a:pPr lvl="0"/>
-            <a:r>
-              <a:rPr/>
-              <a:t>Tips for sourcing relevant data in the “Acquire” step.</a:t>
-            </a:r>
-          </a:p>
-          <a:p>
-            <a:pPr lvl="0" indent="0" marL="0">
-              <a:buNone/>
-            </a:pPr>
-          </a:p>
-          <a:p>
-            <a:pPr lvl="0"/>
-            <a:r>
-              <a:rPr/>
-              <a:t>Explanation of common data analysis techniques for the “Analyze” step.</a:t>
-            </a:r>
-          </a:p>
-          <a:p>
-            <a:pPr lvl="0" indent="0" marL="0">
-              <a:buNone/>
-            </a:pPr>
-          </a:p>
-          <a:p>
-            <a:pPr lvl="0"/>
-            <a:r>
-              <a:rPr/>
-              <a:t>Strategies for integrating insights effectively in the “Integrate” step.</a:t>
-            </a:r>
-          </a:p>
-          <a:p>
-            <a:pPr lvl="0" indent="0" marL="0">
-              <a:buNone/>
-            </a:pPr>
-          </a:p>
-          <a:p>
-            <a:pPr lvl="0"/>
-            <a:r>
-              <a:rPr/>
-              <a:t>Guidance on evaluating options in the “Decide” step.</a:t>
-            </a:r>
-          </a:p>
-          <a:p>
-            <a:pPr lvl="0" indent="0" marL="0">
-              <a:buNone/>
-            </a:pPr>
-          </a:p>
-          <a:p>
-            <a:pPr lvl="0"/>
-            <a:r>
-              <a:rPr/>
-              <a:t>Highlight the importance of reflection and learning in the “Iterate” step.</a:t>
-            </a:r>
-          </a:p>
-          <a:p>
-            <a:pPr lvl="0" indent="0" marL="0">
-              <a:buNone/>
-            </a:pPr>
-          </a:p>
-          <a:p>
-            <a:pPr lvl="0"/>
-            <a:r>
-              <a:rPr/>
-              <a:t>Additional notes or references can be added here.</a:t>
+              <a:t>Examples of effective questions for the “Ask” step. Tips for sourcing relevant data in the “Acquire” step. Explanation of common data analysis techniques for the “Analyze” step. Strategies for integrating insights effectively in the “Integrate” step. Guidance on evaluating options in the “Decide” step. Highlight the importance of reflection and learning in the “Iterate” step. Additional notes or references can be added here.</a:t>
             </a:r>
           </a:p>
         </p:txBody>
@@ -984,34 +848,12 @@
           <a:bodyPr/>
           <a:lstStyle/>
           <a:p>
-            <a:pPr lvl="0"/>
+            <a:pPr lvl="0" indent="0" marL="0">
+              <a:buNone/>
+            </a:pPr>
             <a:r>
               <a:rPr/>
-              <a:t>The modified steps aim to enhance clarity and purpose in each stage of the decision-making process.</a:t>
-            </a:r>
-          </a:p>
-          <a:p>
-            <a:pPr lvl="0" indent="0" marL="0">
-              <a:buNone/>
-            </a:pPr>
-          </a:p>
-          <a:p>
-            <a:pPr lvl="0"/>
-            <a:r>
-              <a:rPr/>
-              <a:t>The framework serves as a guide for effective decision-making, ensuring that data-driven insights are incorporated at every step.</a:t>
-            </a:r>
-          </a:p>
-          <a:p>
-            <a:pPr lvl="0" indent="0" marL="0">
-              <a:buNone/>
-            </a:pPr>
-          </a:p>
-          <a:p>
-            <a:pPr lvl="0"/>
-            <a:r>
-              <a:rPr/>
-              <a:t>Continuous improvement and adaptation are facilitated through the framework’s design.</a:t>
+              <a:t>The modified steps aim to enhance clarity and purpose in each stage of the decision-making process. The framework serves as a guide for effective decision-making, ensuring that data-driven insights are incorporated at every step. Continuous improvement and adaptation are facilitated through the framework’s design.</a:t>
             </a:r>
           </a:p>
         </p:txBody>
@@ -1088,34 +930,12 @@
           <a:bodyPr/>
           <a:lstStyle/>
           <a:p>
-            <a:pPr lvl="0"/>
+            <a:pPr lvl="0" indent="0" marL="0">
+              <a:buNone/>
+            </a:pPr>
             <a:r>
               <a:rPr/>
-              <a:t>The infinite design of the framework facilitates ongoing learning and adaptation as decisions are made.</a:t>
-            </a:r>
-          </a:p>
-          <a:p>
-            <a:pPr lvl="0" indent="0" marL="0">
-              <a:buNone/>
-            </a:pPr>
-          </a:p>
-          <a:p>
-            <a:pPr lvl="0"/>
-            <a:r>
-              <a:rPr/>
-              <a:t>Empowers individuals to iterate and improve based on past experiences and outcomes.</a:t>
-            </a:r>
-          </a:p>
-          <a:p>
-            <a:pPr lvl="0" indent="0" marL="0">
-              <a:buNone/>
-            </a:pPr>
-          </a:p>
-          <a:p>
-            <a:pPr lvl="0"/>
-            <a:r>
-              <a:rPr/>
-              <a:t>Decision-making is not guaranteed, but the framework enables continuous improvement through reflection and learning.</a:t>
+              <a:t>The infinite design of the framework facilitates ongoing learning and adaptation as decisions are made. Empowers individuals to iterate and improve based on past experiences and outcomes. Decision-making is not guaranteed, but the framework enables continuous improvement through reflection and learning.</a:t>
             </a:r>
           </a:p>
         </p:txBody>
@@ -1192,34 +1012,12 @@
           <a:bodyPr/>
           <a:lstStyle/>
           <a:p>
-            <a:pPr lvl="0"/>
+            <a:pPr lvl="0" indent="0" marL="0">
+              <a:buNone/>
+            </a:pPr>
             <a:r>
               <a:rPr/>
-              <a:t>Each step plays a crucial role in empowering data informed decision-making.</a:t>
-            </a:r>
-          </a:p>
-          <a:p>
-            <a:pPr lvl="0" indent="0" marL="0">
-              <a:buNone/>
-            </a:pPr>
-          </a:p>
-          <a:p>
-            <a:pPr lvl="0"/>
-            <a:r>
-              <a:rPr/>
-              <a:t>Data literacy skills are essential for effectively navigating through the decision-making process.</a:t>
-            </a:r>
-          </a:p>
-          <a:p>
-            <a:pPr lvl="0" indent="0" marL="0">
-              <a:buNone/>
-            </a:pPr>
-          </a:p>
-          <a:p>
-            <a:pPr lvl="0"/>
-            <a:r>
-              <a:rPr/>
-              <a:t>Understanding the framework helps individuals make informed decisions by following a structured approach.</a:t>
+              <a:t>Each step plays a crucial role in empowering data informed decision-making. Data literacy skills are essential for effectively navigating through the decision-making process. Understanding the framework helps individuals make informed decisions by following a structured approach.</a:t>
             </a:r>
           </a:p>
         </p:txBody>
@@ -1296,34 +1094,12 @@
           <a:bodyPr/>
           <a:lstStyle/>
           <a:p>
-            <a:pPr lvl="0"/>
+            <a:pPr lvl="0" indent="0" marL="0">
+              <a:buNone/>
+            </a:pPr>
             <a:r>
               <a:rPr/>
-              <a:t>Asking relevant questions is fundamental to initiating the decision-making journey.</a:t>
-            </a:r>
-          </a:p>
-          <a:p>
-            <a:pPr lvl="0" indent="0" marL="0">
-              <a:buNone/>
-            </a:pPr>
-          </a:p>
-          <a:p>
-            <a:pPr lvl="0"/>
-            <a:r>
-              <a:rPr/>
-              <a:t>Effective questioning ensures clarity and alignment with desired outcomes.</a:t>
-            </a:r>
-          </a:p>
-          <a:p>
-            <a:pPr lvl="0" indent="0" marL="0">
-              <a:buNone/>
-            </a:pPr>
-          </a:p>
-          <a:p>
-            <a:pPr lvl="0"/>
-            <a:r>
-              <a:rPr/>
-              <a:t>The “Ask” step sets the foundation for the entire decision-making process by defining the problem or objective.</a:t>
+              <a:t>Asking relevant questions is fundamental to initiating the decision-making journey. Effective questioning ensures clarity and alignment with desired outcomes. The “Ask” step sets the foundation for the entire decision-making process by defining the problem or objective.</a:t>
             </a:r>
           </a:p>
         </p:txBody>
@@ -1400,34 +1176,12 @@
           <a:bodyPr/>
           <a:lstStyle/>
           <a:p>
-            <a:pPr lvl="0"/>
+            <a:pPr lvl="0" indent="0" marL="0">
+              <a:buNone/>
+            </a:pPr>
             <a:r>
               <a:rPr/>
-              <a:t>Acquiring relevant data is essential for informed decision-making.</a:t>
-            </a:r>
-          </a:p>
-          <a:p>
-            <a:pPr lvl="0" indent="0" marL="0">
-              <a:buNone/>
-            </a:pPr>
-          </a:p>
-          <a:p>
-            <a:pPr lvl="0"/>
-            <a:r>
-              <a:rPr/>
-              <a:t>This step involves gathering data from diverse sources to inform the analysis process.</a:t>
-            </a:r>
-          </a:p>
-          <a:p>
-            <a:pPr lvl="0" indent="0" marL="0">
-              <a:buNone/>
-            </a:pPr>
-          </a:p>
-          <a:p>
-            <a:pPr lvl="0"/>
-            <a:r>
-              <a:rPr/>
-              <a:t>Data acquisition lays the foundation for subsequent steps in the decision-making framework.</a:t>
+              <a:t>Acquiring relevant data is essential for informed decision-making. This step involves gathering data from diverse sources to inform the analysis process. Data acquisition lays the foundation for subsequent steps in the decision-making framework.</a:t>
             </a:r>
           </a:p>
         </p:txBody>
@@ -1504,34 +1258,12 @@
           <a:bodyPr/>
           <a:lstStyle/>
           <a:p>
-            <a:pPr lvl="0"/>
+            <a:pPr lvl="0" indent="0" marL="0">
+              <a:buNone/>
+            </a:pPr>
             <a:r>
               <a:rPr/>
-              <a:t>Data analysis techniques are crucial for extracting insights from the acquired data.</a:t>
-            </a:r>
-          </a:p>
-          <a:p>
-            <a:pPr lvl="0" indent="0" marL="0">
-              <a:buNone/>
-            </a:pPr>
-          </a:p>
-          <a:p>
-            <a:pPr lvl="0"/>
-            <a:r>
-              <a:rPr/>
-              <a:t>Analytical skills enable individuals to interpret data accurately and derive meaningful conclusions.</a:t>
-            </a:r>
-          </a:p>
-          <a:p>
-            <a:pPr lvl="0" indent="0" marL="0">
-              <a:buNone/>
-            </a:pPr>
-          </a:p>
-          <a:p>
-            <a:pPr lvl="0"/>
-            <a:r>
-              <a:rPr/>
-              <a:t>Analysis helps uncover patterns and trends that inform decision-making.</a:t>
+              <a:t>Data analysis techniques are crucial for extracting insights from the acquired data. Analytical skills enable individuals to interpret data accurately and derive meaningful conclusions. Analysis helps uncover patterns and trends that inform decision-making.</a:t>
             </a:r>
           </a:p>
         </p:txBody>
@@ -1608,34 +1340,12 @@
           <a:bodyPr/>
           <a:lstStyle/>
           <a:p>
-            <a:pPr lvl="0"/>
+            <a:pPr lvl="0" indent="0" marL="0">
+              <a:buNone/>
+            </a:pPr>
             <a:r>
               <a:rPr/>
-              <a:t>Integration involves synthesizing insights from data analysis to form a comprehensive understanding.</a:t>
-            </a:r>
-          </a:p>
-          <a:p>
-            <a:pPr lvl="0" indent="0" marL="0">
-              <a:buNone/>
-            </a:pPr>
-          </a:p>
-          <a:p>
-            <a:pPr lvl="0"/>
-            <a:r>
-              <a:rPr/>
-              <a:t>This step ensures that data-driven insights are effectively incorporated into the decision-making process.</a:t>
-            </a:r>
-          </a:p>
-          <a:p>
-            <a:pPr lvl="0" indent="0" marL="0">
-              <a:buNone/>
-            </a:pPr>
-          </a:p>
-          <a:p>
-            <a:pPr lvl="0"/>
-            <a:r>
-              <a:rPr/>
-              <a:t>Integrating insights from various sources enhances the robustness of decision-making.</a:t>
+              <a:t>Integration involves synthesizing insights from data analysis to form a comprehensive understanding. This step ensures that data-driven insights are effectively incorporated into the decision-making process. Integrating insights from various sources enhances the robustness of decision-making.</a:t>
             </a:r>
           </a:p>
         </p:txBody>
@@ -1712,34 +1422,12 @@
           <a:bodyPr/>
           <a:lstStyle/>
           <a:p>
-            <a:pPr lvl="0"/>
+            <a:pPr lvl="0" indent="0" marL="0">
+              <a:buNone/>
+            </a:pPr>
             <a:r>
               <a:rPr/>
-              <a:t>Decision-making involves evaluating options based on integrated insights and considering various factors, risks, and benefits.</a:t>
-            </a:r>
-          </a:p>
-          <a:p>
-            <a:pPr lvl="0" indent="0" marL="0">
-              <a:buNone/>
-            </a:pPr>
-          </a:p>
-          <a:p>
-            <a:pPr lvl="0"/>
-            <a:r>
-              <a:rPr/>
-              <a:t>It is essential to weigh these factors to make informed choices that align with organizational objectives.</a:t>
-            </a:r>
-          </a:p>
-          <a:p>
-            <a:pPr lvl="0" indent="0" marL="0">
-              <a:buNone/>
-            </a:pPr>
-          </a:p>
-          <a:p>
-            <a:pPr lvl="0"/>
-            <a:r>
-              <a:rPr/>
-              <a:t>The “Decide” step determines the best course of action based on the analysis and integration of data-driven insights.</a:t>
+              <a:t>Decision-making involves evaluating options based on integrated insights and considering various factors, risks, and benefits. It is essential to weigh these factors to make informed choices that align with organizational objectives. The “Decide” step determines the best course of action based on the analysis and integration of data-driven insights.</a:t>
             </a:r>
           </a:p>
         </p:txBody>
@@ -10369,12 +10057,66 @@
             </a:r>
           </a:p>
           <a:p>
-            <a:pPr lvl="0" indent="0" marL="0">
-              <a:buNone/>
-            </a:pPr>
+            <a:pPr lvl="0"/>
             <a:r>
               <a:rPr/>
-              <a:t>Steps of the data informed decision-making framework 158 Step 1: Ask 160 Step 2: Acquire 162 Step 3: Analyze 164 Step 4: Integrate 167 Step 5: Decide 171 Step 6: Iterate 173 Chapter summary and example 175 Notes 177</a:t>
+              <a:t>Steps of the data informed decision-making framework 158</a:t>
+            </a:r>
+          </a:p>
+          <a:p>
+            <a:pPr lvl="0"/>
+            <a:r>
+              <a:rPr/>
+              <a:t>Step 1: Ask 160</a:t>
+            </a:r>
+          </a:p>
+          <a:p>
+            <a:pPr lvl="0"/>
+            <a:r>
+              <a:rPr/>
+              <a:t>Step 2: Acquire 162</a:t>
+            </a:r>
+          </a:p>
+          <a:p>
+            <a:pPr lvl="0"/>
+            <a:r>
+              <a:rPr/>
+              <a:t>Step 3: Analyze 164</a:t>
+            </a:r>
+          </a:p>
+          <a:p>
+            <a:pPr lvl="0"/>
+            <a:r>
+              <a:rPr/>
+              <a:t>Step 4: Integrate 167</a:t>
+            </a:r>
+          </a:p>
+          <a:p>
+            <a:pPr lvl="0"/>
+            <a:r>
+              <a:rPr/>
+              <a:t>Step 5: Decide 171</a:t>
+            </a:r>
+          </a:p>
+          <a:p>
+            <a:pPr lvl="0"/>
+            <a:r>
+              <a:rPr/>
+              <a:t>Step 6: Iterate 173</a:t>
+            </a:r>
+          </a:p>
+          <a:p>
+            <a:pPr lvl="0"/>
+            <a:r>
+              <a:rPr/>
+              <a:t>Chapter summary and example 175</a:t>
+            </a:r>
+          </a:p>
+          <a:p>
+            <a:pPr lvl="0"/>
+            <a:r>
+              <a:rPr/>
+              <a:t>Notes 177</a:t>
             </a:r>
           </a:p>
         </p:txBody>
@@ -10444,7 +10186,21 @@
             <a:pPr lvl="0"/>
             <a:r>
               <a:rPr/>
-              <a:t>Evaluating options.</a:t>
+              <a:t>Based on integrated insights.</a:t>
+            </a:r>
+          </a:p>
+          <a:p>
+            <a:pPr lvl="0"/>
+            <a:r>
+              <a:rPr/>
+              <a:t>Weigh factors, risks, and benefits.</a:t>
+            </a:r>
+          </a:p>
+          <a:p>
+            <a:pPr lvl="0"/>
+            <a:r>
+              <a:rPr/>
+              <a:t>Determines the best course of action.</a:t>
             </a:r>
           </a:p>
         </p:txBody>
@@ -10514,7 +10270,21 @@
             <a:pPr lvl="0"/>
             <a:r>
               <a:rPr/>
-              <a:t>Significance of iteration.</a:t>
+              <a:t>Crucial for refining decisions.</a:t>
+            </a:r>
+          </a:p>
+          <a:p>
+            <a:pPr lvl="0"/>
+            <a:r>
+              <a:rPr/>
+              <a:t>Learning from past decisions.</a:t>
+            </a:r>
+          </a:p>
+          <a:p>
+            <a:pPr lvl="0"/>
+            <a:r>
+              <a:rPr/>
+              <a:t>Enhances the effectiveness of decision-making.</a:t>
             </a:r>
           </a:p>
         </p:txBody>
@@ -10584,7 +10354,21 @@
             <a:pPr lvl="0"/>
             <a:r>
               <a:rPr/>
-              <a:t>Summary of key concepts.</a:t>
+              <a:t>Highlights key concepts.</a:t>
+            </a:r>
+          </a:p>
+          <a:p>
+            <a:pPr lvl="0"/>
+            <a:r>
+              <a:rPr/>
+              <a:t>Illustrates application in real-world scenario.</a:t>
+            </a:r>
+          </a:p>
+          <a:p>
+            <a:pPr lvl="0"/>
+            <a:r>
+              <a:rPr/>
+              <a:t>Empowers individuals and organizations.</a:t>
             </a:r>
           </a:p>
         </p:txBody>
@@ -10727,6 +10511,20 @@
               <a:t>Six essential steps for decision-making.</a:t>
             </a:r>
           </a:p>
+          <a:p>
+            <a:pPr lvl="0"/>
+            <a:r>
+              <a:rPr/>
+              <a:t>Incorporate these steps in any decision-making framework.</a:t>
+            </a:r>
+          </a:p>
+          <a:p>
+            <a:pPr lvl="0"/>
+            <a:r>
+              <a:rPr/>
+              <a:t>Ensure continuous improvement and learning.</a:t>
+            </a:r>
+          </a:p>
         </p:txBody>
       </p:sp>
     </p:spTree>
@@ -10797,6 +10595,20 @@
               <a:t>Modified steps for clarity.</a:t>
             </a:r>
           </a:p>
+          <a:p>
+            <a:pPr lvl="0"/>
+            <a:r>
+              <a:rPr/>
+              <a:t>Enhance purpose and understanding.</a:t>
+            </a:r>
+          </a:p>
+          <a:p>
+            <a:pPr lvl="0"/>
+            <a:r>
+              <a:rPr/>
+              <a:t>Ensure data-driven insights at every step.</a:t>
+            </a:r>
+          </a:p>
         </p:txBody>
       </p:sp>
     </p:spTree>
@@ -10864,7 +10676,21 @@
             <a:pPr lvl="0"/>
             <a:r>
               <a:rPr/>
-              <a:t>Framework’s infinite design.</a:t>
+              <a:t>Facilitates ongoing learning and adaptation.</a:t>
+            </a:r>
+          </a:p>
+          <a:p>
+            <a:pPr lvl="0"/>
+            <a:r>
+              <a:rPr/>
+              <a:t>Empowers individuals to iterate and improve.</a:t>
+            </a:r>
+          </a:p>
+          <a:p>
+            <a:pPr lvl="0"/>
+            <a:r>
+              <a:rPr/>
+              <a:t>Decision-making is not guaranteed, but enables continuous improvement.</a:t>
             </a:r>
           </a:p>
         </p:txBody>
@@ -10934,7 +10760,21 @@
             <a:pPr lvl="0"/>
             <a:r>
               <a:rPr/>
-              <a:t>Delve into each step.</a:t>
+              <a:t>Each step plays a crucial role.</a:t>
+            </a:r>
+          </a:p>
+          <a:p>
+            <a:pPr lvl="0"/>
+            <a:r>
+              <a:rPr/>
+              <a:t>Data literacy skills are essential.</a:t>
+            </a:r>
+          </a:p>
+          <a:p>
+            <a:pPr lvl="0"/>
+            <a:r>
+              <a:rPr/>
+              <a:t>Helps in making informed decisions.</a:t>
             </a:r>
           </a:p>
         </p:txBody>
@@ -11004,7 +10844,21 @@
             <a:pPr lvl="0"/>
             <a:r>
               <a:rPr/>
-              <a:t>Importance of asking questions.</a:t>
+              <a:t>Fundamental to initiating the decision-making journey.</a:t>
+            </a:r>
+          </a:p>
+          <a:p>
+            <a:pPr lvl="0"/>
+            <a:r>
+              <a:rPr/>
+              <a:t>Ensures clarity and alignment with desired outcomes.</a:t>
+            </a:r>
+          </a:p>
+          <a:p>
+            <a:pPr lvl="0"/>
+            <a:r>
+              <a:rPr/>
+              <a:t>Sets the foundation for the entire process.</a:t>
             </a:r>
           </a:p>
         </p:txBody>
@@ -11074,7 +10928,21 @@
             <a:pPr lvl="0"/>
             <a:r>
               <a:rPr/>
-              <a:t>Significance of acquiring relevant data.</a:t>
+              <a:t>Essential for informed decision-making.</a:t>
+            </a:r>
+          </a:p>
+          <a:p>
+            <a:pPr lvl="0"/>
+            <a:r>
+              <a:rPr/>
+              <a:t>Involves gathering data from diverse sources.</a:t>
+            </a:r>
+          </a:p>
+          <a:p>
+            <a:pPr lvl="0"/>
+            <a:r>
+              <a:rPr/>
+              <a:t>Lays the foundation for subsequent steps.</a:t>
             </a:r>
           </a:p>
         </p:txBody>
@@ -11144,7 +11012,21 @@
             <a:pPr lvl="0"/>
             <a:r>
               <a:rPr/>
-              <a:t>Importance of data analysis.</a:t>
+              <a:t>Crucial for extracting insights from data.</a:t>
+            </a:r>
+          </a:p>
+          <a:p>
+            <a:pPr lvl="0"/>
+            <a:r>
+              <a:rPr/>
+              <a:t>Enables accurate interpretation.</a:t>
+            </a:r>
+          </a:p>
+          <a:p>
+            <a:pPr lvl="0"/>
+            <a:r>
+              <a:rPr/>
+              <a:t>Uncover patterns and trends.</a:t>
             </a:r>
           </a:p>
         </p:txBody>
@@ -11214,7 +11096,21 @@
             <a:pPr lvl="0"/>
             <a:r>
               <a:rPr/>
-              <a:t>Role of integration.</a:t>
+              <a:t>Synthesizes insights for comprehensive understanding.</a:t>
+            </a:r>
+          </a:p>
+          <a:p>
+            <a:pPr lvl="0"/>
+            <a:r>
+              <a:rPr/>
+              <a:t>Ensures effective incorporation of data-driven insights.</a:t>
+            </a:r>
+          </a:p>
+          <a:p>
+            <a:pPr lvl="0"/>
+            <a:r>
+              <a:rPr/>
+              <a:t>Enhances the robustness of decision-making.</a:t>
             </a:r>
           </a:p>
         </p:txBody>

</xml_diff>

<commit_message>
added more detail to the notes section using new model released today
</commit_message>
<xml_diff>
--- a/Chapter09.pptx
+++ b/Chapter09.pptx
@@ -4,17 +4,11 @@
   <p:sldMasterIdLst>
     <p:sldMasterId id="2147483660" r:id="rId1"/>
   </p:sldMasterIdLst>
-  <p:notesMasterIdLst>
-    <p:notesMasterId r:id="rId9"/>
-  </p:notesMasterIdLst>
   <p:sldIdLst>
     <p:sldId id="256" r:id="rId2"/>
     <p:sldId id="257" r:id="rId3"/>
     <p:sldId id="258" r:id="rId4"/>
     <p:sldId id="259" r:id="rId5"/>
-    <p:sldId id="260" r:id="rId6"/>
-    <p:sldId id="261" r:id="rId7"/>
-    <p:sldId id="262" r:id="rId8"/>
   </p:sldIdLst>
   <p:sldSz cx="12192000" cy="6858000"/>
   <p:notesSz cx="6858000" cy="9144000"/>
@@ -119,765 +113,6 @@
     </p:ext>
   </p:extLst>
 </p:presentation>
-</file>
-
-<file path=ppt/notesMasters/notesMaster1.xml><?xml version="1.0" encoding="utf-8"?>
-<p:notesMaster xmlns:a="http://schemas.openxmlformats.org/drawingml/2006/main" xmlns:r="http://schemas.openxmlformats.org/officeDocument/2006/relationships" xmlns:p="http://schemas.openxmlformats.org/presentationml/2006/main">
-  <p:cSld>
-    <p:bg>
-      <p:bgRef idx="1001">
-        <a:schemeClr val="bg1"/>
-      </p:bgRef>
-    </p:bg>
-    <p:spTree>
-      <p:nvGrpSpPr>
-        <p:cNvPr id="1" name=""/>
-        <p:cNvGrpSpPr/>
-        <p:nvPr/>
-      </p:nvGrpSpPr>
-      <p:grpSpPr>
-        <a:xfrm>
-          <a:off x="0" y="0"/>
-          <a:ext cx="0" cy="0"/>
-          <a:chOff x="0" y="0"/>
-          <a:chExt cx="0" cy="0"/>
-        </a:xfrm>
-      </p:grpSpPr>
-      <p:sp>
-        <p:nvSpPr>
-          <p:cNvPr id="2" name="Header Placeholder 1"/>
-          <p:cNvSpPr>
-            <a:spLocks noGrp="1"/>
-          </p:cNvSpPr>
-          <p:nvPr>
-            <p:ph type="hdr" sz="quarter"/>
-          </p:nvPr>
-        </p:nvSpPr>
-        <p:spPr>
-          <a:xfrm>
-            <a:off x="0" y="0"/>
-            <a:ext cx="2971800" cy="458788"/>
-          </a:xfrm>
-          <a:prstGeom prst="rect">
-            <a:avLst/>
-          </a:prstGeom>
-        </p:spPr>
-        <p:txBody>
-          <a:bodyPr vert="horz" lIns="91440" tIns="45720" rIns="91440" bIns="45720" rtlCol="0"/>
-          <a:lstStyle>
-            <a:lvl1pPr algn="l">
-              <a:defRPr sz="1200"/>
-            </a:lvl1pPr>
-          </a:lstStyle>
-          <a:p>
-            <a:endParaRPr lang="en-US"/>
-          </a:p>
-        </p:txBody>
-      </p:sp>
-      <p:sp>
-        <p:nvSpPr>
-          <p:cNvPr id="3" name="Date Placeholder 2"/>
-          <p:cNvSpPr>
-            <a:spLocks noGrp="1"/>
-          </p:cNvSpPr>
-          <p:nvPr>
-            <p:ph type="dt" idx="1"/>
-          </p:nvPr>
-        </p:nvSpPr>
-        <p:spPr>
-          <a:xfrm>
-            <a:off x="3884613" y="0"/>
-            <a:ext cx="2971800" cy="458788"/>
-          </a:xfrm>
-          <a:prstGeom prst="rect">
-            <a:avLst/>
-          </a:prstGeom>
-        </p:spPr>
-        <p:txBody>
-          <a:bodyPr vert="horz" lIns="91440" tIns="45720" rIns="91440" bIns="45720" rtlCol="0"/>
-          <a:lstStyle>
-            <a:lvl1pPr algn="r">
-              <a:defRPr sz="1200"/>
-            </a:lvl1pPr>
-          </a:lstStyle>
-          <a:p>
-            <a:fld id="{0F9C1CCF-B725-44A7-AA57-5E433BD85C9F}" type="datetimeFigureOut">
-              <a:rPr lang="en-US" smtClean="0"/>
-              <a:t>1/2/22</a:t>
-            </a:fld>
-            <a:endParaRPr lang="en-US"/>
-          </a:p>
-        </p:txBody>
-      </p:sp>
-      <p:sp>
-        <p:nvSpPr>
-          <p:cNvPr id="4" name="Slide Image Placeholder 3"/>
-          <p:cNvSpPr>
-            <a:spLocks noGrp="1" noRot="1" noChangeAspect="1"/>
-          </p:cNvSpPr>
-          <p:nvPr>
-            <p:ph type="sldImg" idx="2"/>
-          </p:nvPr>
-        </p:nvSpPr>
-        <p:spPr>
-          <a:xfrm>
-            <a:off x="685800" y="1143000"/>
-            <a:ext cx="5486400" cy="3086100"/>
-          </a:xfrm>
-          <a:prstGeom prst="rect">
-            <a:avLst/>
-          </a:prstGeom>
-          <a:noFill/>
-          <a:ln w="12700">
-            <a:solidFill>
-              <a:prstClr val="black"/>
-            </a:solidFill>
-          </a:ln>
-        </p:spPr>
-        <p:txBody>
-          <a:bodyPr vert="horz" lIns="91440" tIns="45720" rIns="91440" bIns="45720" rtlCol="0" anchor="ctr"/>
-          <a:lstStyle/>
-          <a:p>
-            <a:endParaRPr lang="en-US"/>
-          </a:p>
-        </p:txBody>
-      </p:sp>
-      <p:sp>
-        <p:nvSpPr>
-          <p:cNvPr id="5" name="Notes Placeholder 4"/>
-          <p:cNvSpPr>
-            <a:spLocks noGrp="1"/>
-          </p:cNvSpPr>
-          <p:nvPr>
-            <p:ph type="body" sz="quarter" idx="3"/>
-          </p:nvPr>
-        </p:nvSpPr>
-        <p:spPr>
-          <a:xfrm>
-            <a:off x="685800" y="4400550"/>
-            <a:ext cx="5486400" cy="3600450"/>
-          </a:xfrm>
-          <a:prstGeom prst="rect">
-            <a:avLst/>
-          </a:prstGeom>
-        </p:spPr>
-        <p:txBody>
-          <a:bodyPr vert="horz" lIns="91440" tIns="45720" rIns="91440" bIns="45720" rtlCol="0"/>
-          <a:lstStyle/>
-          <a:p>
-            <a:pPr lvl="0"/>
-            <a:r>
-              <a:rPr lang="en-US"/>
-              <a:t>Click to edit Master text styles</a:t>
-            </a:r>
-          </a:p>
-          <a:p>
-            <a:pPr lvl="1"/>
-            <a:r>
-              <a:rPr lang="en-US"/>
-              <a:t>Second level</a:t>
-            </a:r>
-          </a:p>
-          <a:p>
-            <a:pPr lvl="2"/>
-            <a:r>
-              <a:rPr lang="en-US"/>
-              <a:t>Third level</a:t>
-            </a:r>
-          </a:p>
-          <a:p>
-            <a:pPr lvl="3"/>
-            <a:r>
-              <a:rPr lang="en-US"/>
-              <a:t>Fourth level</a:t>
-            </a:r>
-          </a:p>
-          <a:p>
-            <a:pPr lvl="4"/>
-            <a:r>
-              <a:rPr lang="en-US"/>
-              <a:t>Fifth level</a:t>
-            </a:r>
-          </a:p>
-        </p:txBody>
-      </p:sp>
-      <p:sp>
-        <p:nvSpPr>
-          <p:cNvPr id="6" name="Footer Placeholder 5"/>
-          <p:cNvSpPr>
-            <a:spLocks noGrp="1"/>
-          </p:cNvSpPr>
-          <p:nvPr>
-            <p:ph type="ftr" sz="quarter" idx="4"/>
-          </p:nvPr>
-        </p:nvSpPr>
-        <p:spPr>
-          <a:xfrm>
-            <a:off x="0" y="8685213"/>
-            <a:ext cx="2971800" cy="458787"/>
-          </a:xfrm>
-          <a:prstGeom prst="rect">
-            <a:avLst/>
-          </a:prstGeom>
-        </p:spPr>
-        <p:txBody>
-          <a:bodyPr vert="horz" lIns="91440" tIns="45720" rIns="91440" bIns="45720" rtlCol="0" anchor="b"/>
-          <a:lstStyle>
-            <a:lvl1pPr algn="l">
-              <a:defRPr sz="1200"/>
-            </a:lvl1pPr>
-          </a:lstStyle>
-          <a:p>
-            <a:endParaRPr lang="en-US"/>
-          </a:p>
-        </p:txBody>
-      </p:sp>
-      <p:sp>
-        <p:nvSpPr>
-          <p:cNvPr id="7" name="Slide Number Placeholder 6"/>
-          <p:cNvSpPr>
-            <a:spLocks noGrp="1"/>
-          </p:cNvSpPr>
-          <p:nvPr>
-            <p:ph type="sldNum" sz="quarter" idx="5"/>
-          </p:nvPr>
-        </p:nvSpPr>
-        <p:spPr>
-          <a:xfrm>
-            <a:off x="3884613" y="8685213"/>
-            <a:ext cx="2971800" cy="458787"/>
-          </a:xfrm>
-          <a:prstGeom prst="rect">
-            <a:avLst/>
-          </a:prstGeom>
-        </p:spPr>
-        <p:txBody>
-          <a:bodyPr vert="horz" lIns="91440" tIns="45720" rIns="91440" bIns="45720" rtlCol="0" anchor="b"/>
-          <a:lstStyle>
-            <a:lvl1pPr algn="r">
-              <a:defRPr sz="1200"/>
-            </a:lvl1pPr>
-          </a:lstStyle>
-          <a:p>
-            <a:fld id="{18BDFEC3-8487-43E8-A154-7C12CBC1FFF2}" type="slidenum">
-              <a:rPr lang="en-US" smtClean="0"/>
-              <a:t>‹#›</a:t>
-            </a:fld>
-            <a:endParaRPr lang="en-US"/>
-          </a:p>
-        </p:txBody>
-      </p:sp>
-    </p:spTree>
-    <p:extLst>
-      <p:ext uri="{BB962C8B-B14F-4D97-AF65-F5344CB8AC3E}">
-        <p14:creationId xmlns:p14="http://schemas.microsoft.com/office/powerpoint/2010/main" val="3782709779"/>
-      </p:ext>
-    </p:extLst>
-  </p:cSld>
-  <p:clrMap bg1="lt1" tx1="dk1" bg2="lt2" tx2="dk2" accent1="accent1" accent2="accent2" accent3="accent3" accent4="accent4" accent5="accent5" accent6="accent6" hlink="hlink" folHlink="folHlink"/>
-  <p:notesStyle>
-    <a:lvl1pPr marL="0" algn="l" defTabSz="914400" rtl="0" eaLnBrk="1" latinLnBrk="0" hangingPunct="1">
-      <a:defRPr sz="1200" kern="1200">
-        <a:solidFill>
-          <a:schemeClr val="tx1"/>
-        </a:solidFill>
-        <a:latin typeface="+mn-lt"/>
-        <a:ea typeface="+mn-ea"/>
-        <a:cs typeface="+mn-cs"/>
-      </a:defRPr>
-    </a:lvl1pPr>
-    <a:lvl2pPr marL="457200" algn="l" defTabSz="914400" rtl="0" eaLnBrk="1" latinLnBrk="0" hangingPunct="1">
-      <a:defRPr sz="1200" kern="1200">
-        <a:solidFill>
-          <a:schemeClr val="tx1"/>
-        </a:solidFill>
-        <a:latin typeface="+mn-lt"/>
-        <a:ea typeface="+mn-ea"/>
-        <a:cs typeface="+mn-cs"/>
-      </a:defRPr>
-    </a:lvl2pPr>
-    <a:lvl3pPr marL="914400" algn="l" defTabSz="914400" rtl="0" eaLnBrk="1" latinLnBrk="0" hangingPunct="1">
-      <a:defRPr sz="1200" kern="1200">
-        <a:solidFill>
-          <a:schemeClr val="tx1"/>
-        </a:solidFill>
-        <a:latin typeface="+mn-lt"/>
-        <a:ea typeface="+mn-ea"/>
-        <a:cs typeface="+mn-cs"/>
-      </a:defRPr>
-    </a:lvl3pPr>
-    <a:lvl4pPr marL="1371600" algn="l" defTabSz="914400" rtl="0" eaLnBrk="1" latinLnBrk="0" hangingPunct="1">
-      <a:defRPr sz="1200" kern="1200">
-        <a:solidFill>
-          <a:schemeClr val="tx1"/>
-        </a:solidFill>
-        <a:latin typeface="+mn-lt"/>
-        <a:ea typeface="+mn-ea"/>
-        <a:cs typeface="+mn-cs"/>
-      </a:defRPr>
-    </a:lvl4pPr>
-    <a:lvl5pPr marL="1828800" algn="l" defTabSz="914400" rtl="0" eaLnBrk="1" latinLnBrk="0" hangingPunct="1">
-      <a:defRPr sz="1200" kern="1200">
-        <a:solidFill>
-          <a:schemeClr val="tx1"/>
-        </a:solidFill>
-        <a:latin typeface="+mn-lt"/>
-        <a:ea typeface="+mn-ea"/>
-        <a:cs typeface="+mn-cs"/>
-      </a:defRPr>
-    </a:lvl5pPr>
-    <a:lvl6pPr marL="2286000" algn="l" defTabSz="914400" rtl="0" eaLnBrk="1" latinLnBrk="0" hangingPunct="1">
-      <a:defRPr sz="1200" kern="1200">
-        <a:solidFill>
-          <a:schemeClr val="tx1"/>
-        </a:solidFill>
-        <a:latin typeface="+mn-lt"/>
-        <a:ea typeface="+mn-ea"/>
-        <a:cs typeface="+mn-cs"/>
-      </a:defRPr>
-    </a:lvl6pPr>
-    <a:lvl7pPr marL="2743200" algn="l" defTabSz="914400" rtl="0" eaLnBrk="1" latinLnBrk="0" hangingPunct="1">
-      <a:defRPr sz="1200" kern="1200">
-        <a:solidFill>
-          <a:schemeClr val="tx1"/>
-        </a:solidFill>
-        <a:latin typeface="+mn-lt"/>
-        <a:ea typeface="+mn-ea"/>
-        <a:cs typeface="+mn-cs"/>
-      </a:defRPr>
-    </a:lvl7pPr>
-    <a:lvl8pPr marL="3200400" algn="l" defTabSz="914400" rtl="0" eaLnBrk="1" latinLnBrk="0" hangingPunct="1">
-      <a:defRPr sz="1200" kern="1200">
-        <a:solidFill>
-          <a:schemeClr val="tx1"/>
-        </a:solidFill>
-        <a:latin typeface="+mn-lt"/>
-        <a:ea typeface="+mn-ea"/>
-        <a:cs typeface="+mn-cs"/>
-      </a:defRPr>
-    </a:lvl8pPr>
-    <a:lvl9pPr marL="3657600" algn="l" defTabSz="914400" rtl="0" eaLnBrk="1" latinLnBrk="0" hangingPunct="1">
-      <a:defRPr sz="1200" kern="1200">
-        <a:solidFill>
-          <a:schemeClr val="tx1"/>
-        </a:solidFill>
-        <a:latin typeface="+mn-lt"/>
-        <a:ea typeface="+mn-ea"/>
-        <a:cs typeface="+mn-cs"/>
-      </a:defRPr>
-    </a:lvl9pPr>
-  </p:notesStyle>
-</p:notesMaster>
-</file>
-
-<file path=ppt/notesSlides/notesSlide1.xml><?xml version="1.0" encoding="utf-8"?>
-<p:notes xmlns:a="http://schemas.openxmlformats.org/drawingml/2006/main" xmlns:r="http://schemas.openxmlformats.org/officeDocument/2006/relationships" xmlns:p="http://schemas.openxmlformats.org/presentationml/2006/main">
-  <p:cSld>
-    <p:spTree>
-      <p:nvGrpSpPr>
-        <p:cNvPr id="1" name=""/>
-        <p:cNvGrpSpPr/>
-        <p:nvPr/>
-      </p:nvGrpSpPr>
-      <p:grpSpPr>
-        <a:xfrm>
-          <a:off x="0" y="0"/>
-          <a:ext cx="0" cy="0"/>
-          <a:chOff x="0" y="0"/>
-          <a:chExt cx="0" cy="0"/>
-        </a:xfrm>
-      </p:grpSpPr>
-      <p:sp>
-        <p:nvSpPr>
-          <p:cNvPr id="2" name="Slide Image Placeholder 1"/>
-          <p:cNvSpPr>
-            <a:spLocks noGrp="1" noRot="1" noChangeAspect="1"/>
-          </p:cNvSpPr>
-          <p:nvPr>
-            <p:ph type="sldImg"/>
-          </p:nvPr>
-        </p:nvSpPr>
-        <p:spPr/>
-      </p:sp>
-      <p:sp>
-        <p:nvSpPr>
-          <p:cNvPr id="3" name="Notes Placeholder 2"/>
-          <p:cNvSpPr>
-            <a:spLocks noGrp="1"/>
-          </p:cNvSpPr>
-          <p:nvPr>
-            <p:ph type="body" idx="1"/>
-          </p:nvPr>
-        </p:nvSpPr>
-        <p:spPr/>
-        <p:txBody>
-          <a:bodyPr/>
-          <a:lstStyle/>
-          <a:p>
-            <a:pPr lvl="0" indent="0" marL="0">
-              <a:buNone/>
-            </a:pPr>
-            <a:r>
-              <a:rPr/>
-              <a:t>The data informed decision-making framework we are employing for this book has six steps. Please note, there are different frameworks that exist in the world for making a decision, but for a strong decision-making framework to be deployed and used correctly, these six steps need to be incorporated in some way, shape, or form. The six steps are: ask, acquire, analyze, apply, announce, and assess.</a:t>
-            </a:r>
-          </a:p>
-        </p:txBody>
-      </p:sp>
-      <p:sp>
-        <p:nvSpPr>
-          <p:cNvPr id="4" name="Slide Number Placeholder 3"/>
-          <p:cNvSpPr>
-            <a:spLocks noGrp="1"/>
-          </p:cNvSpPr>
-          <p:nvPr>
-            <p:ph type="sldNum" sz="quarter" idx="10"/>
-          </p:nvPr>
-        </p:nvSpPr>
-        <p:spPr/>
-        <p:txBody>
-          <a:bodyPr/>
-          <a:lstStyle/>
-          <a:p>
-            <a:fld id="{18BDFEC3-8487-43E8-A154-7C12CBC1FFF2}" type="slidenum">
-              <a:rPr lang="en-US"/>
-              <a:t>2</a:t>
-            </a:fld>
-            <a:endParaRPr lang="en-US"/>
-          </a:p>
-        </p:txBody>
-      </p:sp>
-    </p:spTree>
-  </p:cSld>
-</p:notes>
-</file>
-
-<file path=ppt/notesSlides/notesSlide2.xml><?xml version="1.0" encoding="utf-8"?>
-<p:notes xmlns:a="http://schemas.openxmlformats.org/drawingml/2006/main" xmlns:r="http://schemas.openxmlformats.org/officeDocument/2006/relationships" xmlns:p="http://schemas.openxmlformats.org/presentationml/2006/main">
-  <p:cSld>
-    <p:spTree>
-      <p:nvGrpSpPr>
-        <p:cNvPr id="1" name=""/>
-        <p:cNvGrpSpPr/>
-        <p:nvPr/>
-      </p:nvGrpSpPr>
-      <p:grpSpPr>
-        <a:xfrm>
-          <a:off x="0" y="0"/>
-          <a:ext cx="0" cy="0"/>
-          <a:chOff x="0" y="0"/>
-          <a:chExt cx="0" cy="0"/>
-        </a:xfrm>
-      </p:grpSpPr>
-      <p:sp>
-        <p:nvSpPr>
-          <p:cNvPr id="2" name="Slide Image Placeholder 1"/>
-          <p:cNvSpPr>
-            <a:spLocks noGrp="1" noRot="1" noChangeAspect="1"/>
-          </p:cNvSpPr>
-          <p:nvPr>
-            <p:ph type="sldImg"/>
-          </p:nvPr>
-        </p:nvSpPr>
-        <p:spPr/>
-      </p:sp>
-      <p:sp>
-        <p:nvSpPr>
-          <p:cNvPr id="3" name="Notes Placeholder 2"/>
-          <p:cNvSpPr>
-            <a:spLocks noGrp="1"/>
-          </p:cNvSpPr>
-          <p:nvPr>
-            <p:ph type="body" idx="1"/>
-          </p:nvPr>
-        </p:nvSpPr>
-        <p:spPr/>
-        <p:txBody>
-          <a:bodyPr/>
-          <a:lstStyle/>
-          <a:p>
-            <a:pPr lvl="0" indent="0" marL="0">
-              <a:buNone/>
-            </a:pPr>
-            <a:r>
-              <a:rPr/>
-              <a:t>I am going to modify these from Kevin’s work a bit and name them: ask, acquire, analyze, integrate, decide, and iterate. The reason for the shift is to clarify more, directed at each purpose and understanding.</a:t>
-            </a:r>
-          </a:p>
-        </p:txBody>
-      </p:sp>
-      <p:sp>
-        <p:nvSpPr>
-          <p:cNvPr id="4" name="Slide Number Placeholder 3"/>
-          <p:cNvSpPr>
-            <a:spLocks noGrp="1"/>
-          </p:cNvSpPr>
-          <p:nvPr>
-            <p:ph type="sldNum" sz="quarter" idx="10"/>
-          </p:nvPr>
-        </p:nvSpPr>
-        <p:spPr/>
-        <p:txBody>
-          <a:bodyPr/>
-          <a:lstStyle/>
-          <a:p>
-            <a:fld id="{18BDFEC3-8487-43E8-A154-7C12CBC1FFF2}" type="slidenum">
-              <a:rPr lang="en-US"/>
-              <a:t>3</a:t>
-            </a:fld>
-            <a:endParaRPr lang="en-US"/>
-          </a:p>
-        </p:txBody>
-      </p:sp>
-    </p:spTree>
-  </p:cSld>
-</p:notes>
-</file>
-
-<file path=ppt/notesSlides/notesSlide3.xml><?xml version="1.0" encoding="utf-8"?>
-<p:notes xmlns:a="http://schemas.openxmlformats.org/drawingml/2006/main" xmlns:r="http://schemas.openxmlformats.org/officeDocument/2006/relationships" xmlns:p="http://schemas.openxmlformats.org/presentationml/2006/main">
-  <p:cSld>
-    <p:spTree>
-      <p:nvGrpSpPr>
-        <p:cNvPr id="1" name=""/>
-        <p:cNvGrpSpPr/>
-        <p:nvPr/>
-      </p:nvGrpSpPr>
-      <p:grpSpPr>
-        <a:xfrm>
-          <a:off x="0" y="0"/>
-          <a:ext cx="0" cy="0"/>
-          <a:chOff x="0" y="0"/>
-          <a:chExt cx="0" cy="0"/>
-        </a:xfrm>
-      </p:grpSpPr>
-      <p:sp>
-        <p:nvSpPr>
-          <p:cNvPr id="2" name="Slide Image Placeholder 1"/>
-          <p:cNvSpPr>
-            <a:spLocks noGrp="1" noRot="1" noChangeAspect="1"/>
-          </p:cNvSpPr>
-          <p:nvPr>
-            <p:ph type="sldImg"/>
-          </p:nvPr>
-        </p:nvSpPr>
-        <p:spPr/>
-      </p:sp>
-      <p:sp>
-        <p:nvSpPr>
-          <p:cNvPr id="3" name="Notes Placeholder 2"/>
-          <p:cNvSpPr>
-            <a:spLocks noGrp="1"/>
-          </p:cNvSpPr>
-          <p:nvPr>
-            <p:ph type="body" idx="1"/>
-          </p:nvPr>
-        </p:nvSpPr>
-        <p:spPr/>
-        <p:txBody>
-          <a:bodyPr/>
-          <a:lstStyle/>
-          <a:p>
-            <a:pPr lvl="0" indent="0" marL="0">
-              <a:buNone/>
-            </a:pPr>
-            <a:r>
-              <a:rPr/>
-              <a:t>Do you notice something about this framework? It is infinite in its design. This is part of the design of data informed decision-making. As we roll through the process of working towards insight and a data informed decision, we must know that nothing is guaranteed with decision-making. This is part of the beauty of a strong data informed decision-making framework: we have the ability to iterate and learn from the past decisions. We never want to sit back and rest on our laurels with our decisions. We want to use our framework and our data literacy skills to improve upon our decisions and help them become even better. Statistics is a field of probabilities and sometimes probabilities do not go the way we want. That is ok, we learn from our decisions, the process, and more.</a:t>
-            </a:r>
-          </a:p>
-        </p:txBody>
-      </p:sp>
-      <p:sp>
-        <p:nvSpPr>
-          <p:cNvPr id="4" name="Slide Number Placeholder 3"/>
-          <p:cNvSpPr>
-            <a:spLocks noGrp="1"/>
-          </p:cNvSpPr>
-          <p:nvPr>
-            <p:ph type="sldNum" sz="quarter" idx="10"/>
-          </p:nvPr>
-        </p:nvSpPr>
-        <p:spPr/>
-        <p:txBody>
-          <a:bodyPr/>
-          <a:lstStyle/>
-          <a:p>
-            <a:fld id="{18BDFEC3-8487-43E8-A154-7C12CBC1FFF2}" type="slidenum">
-              <a:rPr lang="en-US"/>
-              <a:t>4</a:t>
-            </a:fld>
-            <a:endParaRPr lang="en-US"/>
-          </a:p>
-        </p:txBody>
-      </p:sp>
-    </p:spTree>
-  </p:cSld>
-</p:notes>
-</file>
-
-<file path=ppt/notesSlides/notesSlide4.xml><?xml version="1.0" encoding="utf-8"?>
-<p:notes xmlns:a="http://schemas.openxmlformats.org/drawingml/2006/main" xmlns:r="http://schemas.openxmlformats.org/officeDocument/2006/relationships" xmlns:p="http://schemas.openxmlformats.org/presentationml/2006/main">
-  <p:cSld>
-    <p:spTree>
-      <p:nvGrpSpPr>
-        <p:cNvPr id="1" name=""/>
-        <p:cNvGrpSpPr/>
-        <p:nvPr/>
-      </p:nvGrpSpPr>
-      <p:grpSpPr>
-        <a:xfrm>
-          <a:off x="0" y="0"/>
-          <a:ext cx="0" cy="0"/>
-          <a:chOff x="0" y="0"/>
-          <a:chExt cx="0" cy="0"/>
-        </a:xfrm>
-      </p:grpSpPr>
-      <p:sp>
-        <p:nvSpPr>
-          <p:cNvPr id="2" name="Slide Image Placeholder 1"/>
-          <p:cNvSpPr>
-            <a:spLocks noGrp="1" noRot="1" noChangeAspect="1"/>
-          </p:cNvSpPr>
-          <p:nvPr>
-            <p:ph type="sldImg"/>
-          </p:nvPr>
-        </p:nvSpPr>
-        <p:spPr/>
-      </p:sp>
-      <p:sp>
-        <p:nvSpPr>
-          <p:cNvPr id="3" name="Notes Placeholder 2"/>
-          <p:cNvSpPr>
-            <a:spLocks noGrp="1"/>
-          </p:cNvSpPr>
-          <p:nvPr>
-            <p:ph type="body" idx="1"/>
-          </p:nvPr>
-        </p:nvSpPr>
-        <p:spPr/>
-        <p:txBody>
-          <a:bodyPr/>
-          <a:lstStyle/>
-          <a:p>
-            <a:pPr lvl="0" indent="0" marL="0">
-              <a:buNone/>
-            </a:pPr>
-            <a:r>
-              <a:rPr/>
-              <a:t>To help us understand the framework more, let us jump in and understand each step in more detail. Herein we will dive into the different angles of data literacy and how these angles help empower data informed decision-making.</a:t>
-            </a:r>
-          </a:p>
-        </p:txBody>
-      </p:sp>
-      <p:sp>
-        <p:nvSpPr>
-          <p:cNvPr id="4" name="Slide Number Placeholder 3"/>
-          <p:cNvSpPr>
-            <a:spLocks noGrp="1"/>
-          </p:cNvSpPr>
-          <p:nvPr>
-            <p:ph type="sldNum" sz="quarter" idx="10"/>
-          </p:nvPr>
-        </p:nvSpPr>
-        <p:spPr/>
-        <p:txBody>
-          <a:bodyPr/>
-          <a:lstStyle/>
-          <a:p>
-            <a:fld id="{18BDFEC3-8487-43E8-A154-7C12CBC1FFF2}" type="slidenum">
-              <a:rPr lang="en-US"/>
-              <a:t>5</a:t>
-            </a:fld>
-            <a:endParaRPr lang="en-US"/>
-          </a:p>
-        </p:txBody>
-      </p:sp>
-    </p:spTree>
-  </p:cSld>
-</p:notes>
-</file>
-
-<file path=ppt/notesSlides/notesSlide5.xml><?xml version="1.0" encoding="utf-8"?>
-<p:notes xmlns:a="http://schemas.openxmlformats.org/drawingml/2006/main" xmlns:r="http://schemas.openxmlformats.org/officeDocument/2006/relationships" xmlns:p="http://schemas.openxmlformats.org/presentationml/2006/main">
-  <p:cSld>
-    <p:spTree>
-      <p:nvGrpSpPr>
-        <p:cNvPr id="1" name=""/>
-        <p:cNvGrpSpPr/>
-        <p:nvPr/>
-      </p:nvGrpSpPr>
-      <p:grpSpPr>
-        <a:xfrm>
-          <a:off x="0" y="0"/>
-          <a:ext cx="0" cy="0"/>
-          <a:chOff x="0" y="0"/>
-          <a:chExt cx="0" cy="0"/>
-        </a:xfrm>
-      </p:grpSpPr>
-      <p:sp>
-        <p:nvSpPr>
-          <p:cNvPr id="2" name="Slide Image Placeholder 1"/>
-          <p:cNvSpPr>
-            <a:spLocks noGrp="1" noRot="1" noChangeAspect="1"/>
-          </p:cNvSpPr>
-          <p:nvPr>
-            <p:ph type="sldImg"/>
-          </p:nvPr>
-        </p:nvSpPr>
-        <p:spPr/>
-      </p:sp>
-      <p:sp>
-        <p:nvSpPr>
-          <p:cNvPr id="3" name="Notes Placeholder 2"/>
-          <p:cNvSpPr>
-            <a:spLocks noGrp="1"/>
-          </p:cNvSpPr>
-          <p:nvPr>
-            <p:ph type="body" idx="1"/>
-          </p:nvPr>
-        </p:nvSpPr>
-        <p:spPr/>
-        <p:txBody>
-          <a:bodyPr/>
-          <a:lstStyle/>
-          <a:p>
-            <a:pPr lvl="0" indent="0" marL="0">
-              <a:buNone/>
-            </a:pPr>
-            <a:r>
-              <a:rPr/>
-              <a:t>Analyze, Integrate, Decide, Iterate, DATA INFORMED DECISION-MAKING, Acquire, Ask.</a:t>
-            </a:r>
-          </a:p>
-        </p:txBody>
-      </p:sp>
-      <p:sp>
-        <p:nvSpPr>
-          <p:cNvPr id="4" name="Slide Number Placeholder 3"/>
-          <p:cNvSpPr>
-            <a:spLocks noGrp="1"/>
-          </p:cNvSpPr>
-          <p:nvPr>
-            <p:ph type="sldNum" sz="quarter" idx="10"/>
-          </p:nvPr>
-        </p:nvSpPr>
-        <p:spPr/>
-        <p:txBody>
-          <a:bodyPr/>
-          <a:lstStyle/>
-          <a:p>
-            <a:fld id="{18BDFEC3-8487-43E8-A154-7C12CBC1FFF2}" type="slidenum">
-              <a:rPr lang="en-US"/>
-              <a:t>6</a:t>
-            </a:fld>
-            <a:endParaRPr lang="en-US"/>
-          </a:p>
-        </p:txBody>
-      </p:sp>
-    </p:spTree>
-  </p:cSld>
-</p:notes>
 </file>
 
 <file path=ppt/slideLayouts/slideLayout1.xml><?xml version="1.0" encoding="utf-8"?>
@@ -9583,7 +8818,7 @@
             </a:pPr>
             <a:r>
               <a:rPr/>
-              <a:t>Slide 1: Introduction to Data Informed Decision-Making Framework</a:t>
+              <a:t>Title Slide</a:t>
             </a:r>
           </a:p>
         </p:txBody>
@@ -9606,21 +8841,14 @@
             <a:pPr lvl="0"/>
             <a:r>
               <a:rPr/>
-              <a:t>Six essential steps.</a:t>
+              <a:t>Chapter 09: Data Informed Decision-Making :::notes</a:t>
             </a:r>
           </a:p>
           <a:p>
             <a:pPr lvl="0"/>
             <a:r>
               <a:rPr/>
-              <a:t>Different frameworks exist.</a:t>
-            </a:r>
-          </a:p>
-          <a:p>
-            <a:pPr lvl="0"/>
-            <a:r>
-              <a:rPr/>
-              <a:t>Incorporate these steps.</a:t>
+              <a:t>Chapter 09: Data Informed Decision-Making Please note for this book’s purpose we are utilizing the term ‘data informed’ versus ‘data driven’. This is on purpose, but I do concede that in most cases data driven is used in the world today. The term ‘data driven’ really gained steam in the late 2010s and into 2020, and especially moved forward with the onslaught of the worldwide COVID-19 pandemic. To be data driven means many things to many people, but ultimately it means data is strongly being used as an asset for an individual or organization. Think of it as a marathon runner using a plan to drive a strategy for a successful marathon. This is what data driven or data informed means. It means that data is helping to drive decisions and the business forward. The reason I use the term data informed over data driven is that with the term data driven one can make the mistake in thinking that the data is truly driving everything. Data informed means the data was used to help make the decision, but is combined with other things, like the human element. This distinction matters as it is powerful. To help us understand data informed decisions and their combination with data literacy, we will be digging into our entire bag of tricks of data literacy. We will start by defining the framework and its power to drive decision-making. We will be looking at the data informed decision-making framework from what may seem like all possible angles: the four characteristics of the definition of data literacy, the four levels of analytics, speaking the language of data, the three Cs of data literacy, and probably more angles. For us to get started here, we need to know the steps of the data informed decision-making framework. :::</a:t>
             </a:r>
           </a:p>
         </p:txBody>
@@ -9667,7 +8895,7 @@
             </a:pPr>
             <a:r>
               <a:rPr/>
-              <a:t>Slide 2: Modification of the Framework</a:t>
+              <a:t>Introduction</a:t>
             </a:r>
           </a:p>
         </p:txBody>
@@ -9690,21 +8918,42 @@
             <a:pPr lvl="0"/>
             <a:r>
               <a:rPr/>
-              <a:t>Modified for clarity.</a:t>
+              <a:t>Data informed vs. Data driven</a:t>
             </a:r>
           </a:p>
           <a:p>
             <a:pPr lvl="0"/>
             <a:r>
               <a:rPr/>
-              <a:t>Renamed steps.</a:t>
+              <a:t>Framework and power</a:t>
             </a:r>
           </a:p>
           <a:p>
             <a:pPr lvl="0"/>
             <a:r>
               <a:rPr/>
-              <a:t>Enhance understanding.</a:t>
+              <a:t>Impact of data literacy :::notes</a:t>
+            </a:r>
+          </a:p>
+          <a:p>
+            <a:pPr lvl="0"/>
+            <a:r>
+              <a:rPr/>
+              <a:t>Data informed vs. Data driven Please note for this book’s purpose we are utilizing the term ‘data informed’ versus ‘data driven’. This is on purpose, but I do concede that in most cases data driven is used in the world today.</a:t>
+            </a:r>
+          </a:p>
+          <a:p>
+            <a:pPr lvl="0"/>
+            <a:r>
+              <a:rPr/>
+              <a:t>Framework and power The term ‘data driven’ really gained steam in the late 2010s and into 2020, and especially moved forward with the onslaught of the worldwide COVID-19 pandemic.</a:t>
+            </a:r>
+          </a:p>
+          <a:p>
+            <a:pPr lvl="0"/>
+            <a:r>
+              <a:rPr/>
+              <a:t>Impact of data literacy To be data driven means many things to many people, but ultimately it means data is strongly being used as an asset for an individual or organization. Think of it as a marathon runner using a plan to drive a strategy for a successful marathon. :::</a:t>
             </a:r>
           </a:p>
         </p:txBody>
@@ -9751,7 +9000,7 @@
             </a:pPr>
             <a:r>
               <a:rPr/>
-              <a:t>Slide 3: Infinite Design and Learning</a:t>
+              <a:t>Framework Overview</a:t>
             </a:r>
           </a:p>
         </p:txBody>
@@ -9774,282 +9023,42 @@
             <a:pPr lvl="0"/>
             <a:r>
               <a:rPr/>
-              <a:t>Framework’s infinite design.</a:t>
+              <a:t>Steps of the framework</a:t>
             </a:r>
           </a:p>
           <a:p>
             <a:pPr lvl="0"/>
             <a:r>
               <a:rPr/>
-              <a:t>Continuous learning.</a:t>
+              <a:t>Decision-making process</a:t>
             </a:r>
           </a:p>
           <a:p>
             <a:pPr lvl="0"/>
             <a:r>
               <a:rPr/>
-              <a:t>Decision-making not guaranteed.</a:t>
-            </a:r>
-          </a:p>
-        </p:txBody>
-      </p:sp>
-    </p:spTree>
-  </p:cSld>
-</p:sld>
-</file>
-
-<file path=ppt/slides/slide5.xml><?xml version="1.0" encoding="utf-8"?>
-<p:sld xmlns:a="http://schemas.openxmlformats.org/drawingml/2006/main" xmlns:r="http://schemas.openxmlformats.org/officeDocument/2006/relationships" xmlns:p="http://schemas.openxmlformats.org/presentationml/2006/main">
-  <p:cSld>
-    <p:spTree>
-      <p:nvGrpSpPr>
-        <p:cNvPr id="1" name=""/>
-        <p:cNvGrpSpPr/>
-        <p:nvPr/>
-      </p:nvGrpSpPr>
-      <p:grpSpPr>
-        <a:xfrm>
-          <a:off x="0" y="0"/>
-          <a:ext cx="0" cy="0"/>
-          <a:chOff x="0" y="0"/>
-          <a:chExt cx="0" cy="0"/>
-        </a:xfrm>
-      </p:grpSpPr>
-      <p:sp>
-        <p:nvSpPr>
-          <p:cNvPr id="2" name="Title 1"/>
-          <p:cNvSpPr>
-            <a:spLocks noGrp="1"/>
-          </p:cNvSpPr>
-          <p:nvPr>
-            <p:ph type="title"/>
-          </p:nvPr>
-        </p:nvSpPr>
-        <p:spPr/>
-        <p:txBody>
-          <a:bodyPr/>
-          <a:lstStyle/>
-          <a:p>
-            <a:pPr lvl="0" indent="0" marL="0">
-              <a:buNone/>
-            </a:pPr>
+              <a:t>Integration with data literacy :::notes</a:t>
+            </a:r>
+          </a:p>
+          <a:p>
+            <a:pPr lvl="0"/>
             <a:r>
               <a:rPr/>
-              <a:t>Slide 4: Iterative Process</a:t>
-            </a:r>
-          </a:p>
-        </p:txBody>
-      </p:sp>
-      <p:sp>
-        <p:nvSpPr>
-          <p:cNvPr id="3" name="Content Placeholder 2"/>
-          <p:cNvSpPr>
-            <a:spLocks noGrp="1"/>
-          </p:cNvSpPr>
-          <p:nvPr>
-            <p:ph idx="1"/>
-          </p:nvPr>
-        </p:nvSpPr>
-        <p:spPr/>
-        <p:txBody>
-          <a:bodyPr/>
-          <a:lstStyle/>
+              <a:t>Steps of the framework To help us understand data informed decisions and their combination with data literacy, we will be digging into our entire bag of tricks of data literacy.</a:t>
+            </a:r>
+          </a:p>
           <a:p>
             <a:pPr lvl="0"/>
             <a:r>
               <a:rPr/>
-              <a:t>Ability to iterate and learn.</a:t>
+              <a:t>Decision-making process We will start by defining the framework and its power to drive decision-making.</a:t>
             </a:r>
           </a:p>
           <a:p>
             <a:pPr lvl="0"/>
             <a:r>
               <a:rPr/>
-              <a:t>Improve decisions.</a:t>
-            </a:r>
-          </a:p>
-          <a:p>
-            <a:pPr lvl="0"/>
-            <a:r>
-              <a:rPr/>
-              <a:t>Statistics is a field of probabilities.</a:t>
-            </a:r>
-          </a:p>
-        </p:txBody>
-      </p:sp>
-    </p:spTree>
-  </p:cSld>
-</p:sld>
-</file>
-
-<file path=ppt/slides/slide6.xml><?xml version="1.0" encoding="utf-8"?>
-<p:sld xmlns:a="http://schemas.openxmlformats.org/drawingml/2006/main" xmlns:r="http://schemas.openxmlformats.org/officeDocument/2006/relationships" xmlns:p="http://schemas.openxmlformats.org/presentationml/2006/main">
-  <p:cSld>
-    <p:spTree>
-      <p:nvGrpSpPr>
-        <p:cNvPr id="1" name=""/>
-        <p:cNvGrpSpPr/>
-        <p:nvPr/>
-      </p:nvGrpSpPr>
-      <p:grpSpPr>
-        <a:xfrm>
-          <a:off x="0" y="0"/>
-          <a:ext cx="0" cy="0"/>
-          <a:chOff x="0" y="0"/>
-          <a:chExt cx="0" cy="0"/>
-        </a:xfrm>
-      </p:grpSpPr>
-      <p:sp>
-        <p:nvSpPr>
-          <p:cNvPr id="2" name="Title 1"/>
-          <p:cNvSpPr>
-            <a:spLocks noGrp="1"/>
-          </p:cNvSpPr>
-          <p:nvPr>
-            <p:ph type="title"/>
-          </p:nvPr>
-        </p:nvSpPr>
-        <p:spPr/>
-        <p:txBody>
-          <a:bodyPr/>
-          <a:lstStyle/>
-          <a:p>
-            <a:pPr lvl="0" indent="0" marL="0">
-              <a:buNone/>
-            </a:pPr>
-            <a:r>
-              <a:rPr/>
-              <a:t>Slide 5: Understanding Each Step</a:t>
-            </a:r>
-          </a:p>
-        </p:txBody>
-      </p:sp>
-      <p:sp>
-        <p:nvSpPr>
-          <p:cNvPr id="3" name="Content Placeholder 2"/>
-          <p:cNvSpPr>
-            <a:spLocks noGrp="1"/>
-          </p:cNvSpPr>
-          <p:nvPr>
-            <p:ph idx="1"/>
-          </p:nvPr>
-        </p:nvSpPr>
-        <p:spPr/>
-        <p:txBody>
-          <a:bodyPr/>
-          <a:lstStyle/>
-          <a:p>
-            <a:pPr lvl="0"/>
-            <a:r>
-              <a:rPr/>
-              <a:t>Dive into each step.</a:t>
-            </a:r>
-          </a:p>
-          <a:p>
-            <a:pPr lvl="0"/>
-            <a:r>
-              <a:rPr/>
-              <a:t>Explore data literacy.</a:t>
-            </a:r>
-          </a:p>
-          <a:p>
-            <a:pPr lvl="0"/>
-            <a:r>
-              <a:rPr/>
-              <a:t>Empower decision-making.</a:t>
-            </a:r>
-          </a:p>
-        </p:txBody>
-      </p:sp>
-    </p:spTree>
-  </p:cSld>
-</p:sld>
-</file>
-
-<file path=ppt/slides/slide7.xml><?xml version="1.0" encoding="utf-8"?>
-<p:sld xmlns:a="http://schemas.openxmlformats.org/drawingml/2006/main" xmlns:r="http://schemas.openxmlformats.org/officeDocument/2006/relationships" xmlns:p="http://schemas.openxmlformats.org/presentationml/2006/main">
-  <p:cSld>
-    <p:spTree>
-      <p:nvGrpSpPr>
-        <p:cNvPr id="1" name=""/>
-        <p:cNvGrpSpPr/>
-        <p:nvPr/>
-      </p:nvGrpSpPr>
-      <p:grpSpPr>
-        <a:xfrm>
-          <a:off x="0" y="0"/>
-          <a:ext cx="0" cy="0"/>
-          <a:chOff x="0" y="0"/>
-          <a:chExt cx="0" cy="0"/>
-        </a:xfrm>
-      </p:grpSpPr>
-      <p:sp>
-        <p:nvSpPr>
-          <p:cNvPr id="2" name="Title 1"/>
-          <p:cNvSpPr>
-            <a:spLocks noGrp="1"/>
-          </p:cNvSpPr>
-          <p:nvPr>
-            <p:ph type="title"/>
-          </p:nvPr>
-        </p:nvSpPr>
-        <p:spPr/>
-        <p:txBody>
-          <a:bodyPr/>
-          <a:lstStyle/>
-          <a:p>
-            <a:pPr lvl="0" indent="0" marL="0">
-              <a:buNone/>
-            </a:pPr>
-            <a:r>
-              <a:rPr/>
-              <a:t>Slide 6: Conclusion</a:t>
-            </a:r>
-          </a:p>
-        </p:txBody>
-      </p:sp>
-      <p:sp>
-        <p:nvSpPr>
-          <p:cNvPr id="3" name="Content Placeholder 2"/>
-          <p:cNvSpPr>
-            <a:spLocks noGrp="1"/>
-          </p:cNvSpPr>
-          <p:nvPr>
-            <p:ph idx="1"/>
-          </p:nvPr>
-        </p:nvSpPr>
-        <p:spPr/>
-        <p:txBody>
-          <a:bodyPr/>
-          <a:lstStyle/>
-          <a:p>
-            <a:pPr lvl="0"/>
-            <a:r>
-              <a:rPr/>
-              <a:t>Combine insights.</a:t>
-            </a:r>
-          </a:p>
-          <a:p>
-            <a:pPr lvl="0"/>
-            <a:r>
-              <a:rPr/>
-              <a:t>Summarize key points.</a:t>
-            </a:r>
-          </a:p>
-          <a:p>
-            <a:pPr lvl="0"/>
-            <a:r>
-              <a:rPr/>
-              <a:t>Highlight importance.</a:t>
-            </a:r>
-          </a:p>
-          <a:p>
-            <a:pPr lvl="0" indent="0" marL="0">
-              <a:buNone/>
-            </a:pPr>
-            <a:r>
-              <a:rPr/>
-              <a:t>:::notes</a:t>
+              <a:t>Integration with data literacy We will be looking at the data informed decision-making framework from what may seem like all possible angles: the four characteristics of the definition of data literacy, the four levels of analytics, speaking the language of data, the three Cs of data literacy, and probably more angles. :::</a:t>
             </a:r>
           </a:p>
         </p:txBody>

</xml_diff>